<commit_message>
Updated cMSIS Core (Using TrustZone) documentation.
</commit_message>
<xml_diff>
--- a/CMSIS/DoxyGen/Core/src/images/ARMv8-M_images.pptx
+++ b/CMSIS/DoxyGen/Core/src/images/ARMv8-M_images.pptx
@@ -209,7 +209,7 @@
             <a:fld id="{E72D30EF-8F20-0B47-8B5D-39A8BC29E860}" type="datetimeFigureOut">
               <a:rPr lang="en-US" smtClean="0"/>
               <a:pPr/>
-              <a:t>11/2/2015</a:t>
+              <a:t>7/1/2016</a:t>
             </a:fld>
             <a:endParaRPr lang="en-US"/>
           </a:p>
@@ -377,7 +377,7 @@
             <a:fld id="{77EDD36E-1E02-F241-9611-1F1D9EAAD326}" type="datetimeFigureOut">
               <a:rPr lang="en-US" smtClean="0"/>
               <a:pPr/>
-              <a:t>11/2/2015</a:t>
+              <a:t>7/1/2016</a:t>
             </a:fld>
             <a:endParaRPr lang="en-US"/>
           </a:p>
@@ -13575,12 +13575,12 @@
                 <a:defRPr/>
               </a:pPr>
               <a:r>
-                <a:rPr lang="en-US" sz="2000" b="1" dirty="0"/>
-                <a:t>p</a:t>
+                <a:rPr lang="en-US" sz="2000" b="1" smtClean="0"/>
+                <a:t>partition_&lt;</a:t>
               </a:r>
               <a:r>
                 <a:rPr lang="en-US" sz="2000" b="1" dirty="0" smtClean="0"/>
-                <a:t>artitions_&lt;device&gt;.h</a:t>
+                <a:t>device&gt;.h</a:t>
               </a:r>
               <a:r>
                 <a:rPr lang="en-US" sz="2000" b="1" dirty="0"/>
@@ -15386,21 +15386,6 @@
 </file>
 
 <file path=customXml/item1.xml><?xml version="1.0" encoding="utf-8"?>
-<p:properties xmlns:p="http://schemas.microsoft.com/office/2006/metadata/properties" xmlns:xsi="http://www.w3.org/2001/XMLSchema-instance">
-  <documentManagement/>
-</p:properties>
-</file>
-
-<file path=customXml/item2.xml><?xml version="1.0" encoding="utf-8"?>
-<?mso-contentType ?>
-<FormTemplates xmlns="http://schemas.microsoft.com/sharepoint/v3/contenttype/forms">
-  <Display>DocumentLibraryForm</Display>
-  <Edit>DocumentLibraryForm</Edit>
-  <New>DocumentLibraryForm</New>
-</FormTemplates>
-</file>
-
-<file path=customXml/item3.xml><?xml version="1.0" encoding="utf-8"?>
 <ct:contentTypeSchema xmlns:ct="http://schemas.microsoft.com/office/2006/metadata/contentType" xmlns:ma="http://schemas.microsoft.com/office/2006/metadata/properties/metaAttributes" ct:_="" ma:_="" ma:contentTypeName="Document" ma:contentTypeID="0x010100CAE3FC6E4566A44694FF6BF40EC1C126" ma:contentTypeVersion="0" ma:contentTypeDescription="Create a new document." ma:contentTypeScope="" ma:versionID="0c5b8ba185a47c7168257d800a15637f">
   <xsd:schema xmlns:xsd="http://www.w3.org/2001/XMLSchema" xmlns:xs="http://www.w3.org/2001/XMLSchema" xmlns:p="http://schemas.microsoft.com/office/2006/metadata/properties" targetNamespace="http://schemas.microsoft.com/office/2006/metadata/properties" ma:root="true" ma:fieldsID="c64490b4aec6201516c3a874156f37b2">
     <xsd:element name="properties">
@@ -15514,17 +15499,33 @@
 </ct:contentTypeSchema>
 </file>
 
+<file path=customXml/item2.xml><?xml version="1.0" encoding="utf-8"?>
+<?mso-contentType ?>
+<FormTemplates xmlns="http://schemas.microsoft.com/sharepoint/v3/contenttype/forms">
+  <Display>DocumentLibraryForm</Display>
+  <Edit>DocumentLibraryForm</Edit>
+  <New>DocumentLibraryForm</New>
+</FormTemplates>
+</file>
+
+<file path=customXml/item3.xml><?xml version="1.0" encoding="utf-8"?>
+<p:properties xmlns:p="http://schemas.microsoft.com/office/2006/metadata/properties" xmlns:xsi="http://www.w3.org/2001/XMLSchema-instance">
+  <documentManagement/>
+</p:properties>
+</file>
+
 <file path=customXml/itemProps1.xml><?xml version="1.0" encoding="utf-8"?>
-<ds:datastoreItem xmlns:ds="http://schemas.openxmlformats.org/officeDocument/2006/customXml" ds:itemID="{AE6E82D6-7FB8-4D99-A7B6-3C5BB1D894B9}">
+<ds:datastoreItem xmlns:ds="http://schemas.openxmlformats.org/officeDocument/2006/customXml" ds:itemID="{FD99A681-1CE7-4872-A113-126DF10B3AAF}">
   <ds:schemaRefs>
+    <ds:schemaRef ds:uri="http://schemas.microsoft.com/office/2006/metadata/contentType"/>
+    <ds:schemaRef ds:uri="http://schemas.microsoft.com/office/2006/metadata/properties/metaAttributes"/>
+    <ds:schemaRef ds:uri="http://www.w3.org/2001/XMLSchema"/>
+    <ds:schemaRef ds:uri="http://schemas.microsoft.com/office/2006/metadata/properties"/>
     <ds:schemaRef ds:uri="http://schemas.openxmlformats.org/package/2006/metadata/core-properties"/>
-    <ds:schemaRef ds:uri="http://www.w3.org/XML/1998/namespace"/>
     <ds:schemaRef ds:uri="http://purl.org/dc/elements/1.1/"/>
-    <ds:schemaRef ds:uri="http://schemas.microsoft.com/office/2006/documentManagement/types"/>
     <ds:schemaRef ds:uri="http://purl.org/dc/terms/"/>
+    <ds:schemaRef ds:uri="http://schemas.microsoft.com/internal/obd"/>
     <ds:schemaRef ds:uri="http://schemas.microsoft.com/office/infopath/2007/PartnerControls"/>
-    <ds:schemaRef ds:uri="http://schemas.microsoft.com/office/2006/metadata/properties"/>
-    <ds:schemaRef ds:uri="http://purl.org/dc/dcmitype/"/>
   </ds:schemaRefs>
 </ds:datastoreItem>
 </file>
@@ -15538,17 +15539,16 @@
 </file>
 
 <file path=customXml/itemProps3.xml><?xml version="1.0" encoding="utf-8"?>
-<ds:datastoreItem xmlns:ds="http://schemas.openxmlformats.org/officeDocument/2006/customXml" ds:itemID="{FD99A681-1CE7-4872-A113-126DF10B3AAF}">
+<ds:datastoreItem xmlns:ds="http://schemas.openxmlformats.org/officeDocument/2006/customXml" ds:itemID="{AE6E82D6-7FB8-4D99-A7B6-3C5BB1D894B9}">
   <ds:schemaRefs>
-    <ds:schemaRef ds:uri="http://schemas.microsoft.com/office/2006/metadata/contentType"/>
-    <ds:schemaRef ds:uri="http://schemas.microsoft.com/office/2006/metadata/properties/metaAttributes"/>
-    <ds:schemaRef ds:uri="http://www.w3.org/2001/XMLSchema"/>
+    <ds:schemaRef ds:uri="http://schemas.openxmlformats.org/package/2006/metadata/core-properties"/>
+    <ds:schemaRef ds:uri="http://www.w3.org/XML/1998/namespace"/>
+    <ds:schemaRef ds:uri="http://purl.org/dc/elements/1.1/"/>
+    <ds:schemaRef ds:uri="http://schemas.microsoft.com/office/2006/documentManagement/types"/>
+    <ds:schemaRef ds:uri="http://purl.org/dc/terms/"/>
+    <ds:schemaRef ds:uri="http://schemas.microsoft.com/office/infopath/2007/PartnerControls"/>
     <ds:schemaRef ds:uri="http://schemas.microsoft.com/office/2006/metadata/properties"/>
-    <ds:schemaRef ds:uri="http://schemas.openxmlformats.org/package/2006/metadata/core-properties"/>
-    <ds:schemaRef ds:uri="http://purl.org/dc/elements/1.1/"/>
-    <ds:schemaRef ds:uri="http://purl.org/dc/terms/"/>
-    <ds:schemaRef ds:uri="http://schemas.microsoft.com/internal/obd"/>
-    <ds:schemaRef ds:uri="http://schemas.microsoft.com/office/infopath/2007/PartnerControls"/>
+    <ds:schemaRef ds:uri="http://purl.org/dc/dcmitype/"/>
   </ds:schemaRefs>
 </ds:datastoreItem>
 </file>
</xml_diff>

<commit_message>
CMSIS-Core documentation added TX_context.h and minor enhancments/corrections
</commit_message>
<xml_diff>
--- a/CMSIS/DoxyGen/Core/src/images/ARMv8-M_images.pptx
+++ b/CMSIS/DoxyGen/Core/src/images/ARMv8-M_images.pptx
@@ -5,10 +5,10 @@
     <p:sldMasterId id="2147483716" r:id="rId4"/>
   </p:sldMasterIdLst>
   <p:notesMasterIdLst>
-    <p:notesMasterId r:id="rId10"/>
+    <p:notesMasterId r:id="rId11"/>
   </p:notesMasterIdLst>
   <p:handoutMasterIdLst>
-    <p:handoutMasterId r:id="rId11"/>
+    <p:handoutMasterId r:id="rId12"/>
   </p:handoutMasterIdLst>
   <p:sldIdLst>
     <p:sldId id="268" r:id="rId5"/>
@@ -16,6 +16,7 @@
     <p:sldId id="270" r:id="rId7"/>
     <p:sldId id="271" r:id="rId8"/>
     <p:sldId id="261" r:id="rId9"/>
+    <p:sldId id="272" r:id="rId10"/>
   </p:sldIdLst>
   <p:sldSz cx="12188825" cy="6858000"/>
   <p:notesSz cx="6794500" cy="9918700"/>
@@ -209,7 +210,7 @@
             <a:fld id="{E72D30EF-8F20-0B47-8B5D-39A8BC29E860}" type="datetimeFigureOut">
               <a:rPr lang="en-US" smtClean="0"/>
               <a:pPr/>
-              <a:t>7/1/2016</a:t>
+              <a:t>9/26/2016</a:t>
             </a:fld>
             <a:endParaRPr lang="en-US"/>
           </a:p>
@@ -377,7 +378,7 @@
             <a:fld id="{77EDD36E-1E02-F241-9611-1F1D9EAAD326}" type="datetimeFigureOut">
               <a:rPr lang="en-US" smtClean="0"/>
               <a:pPr/>
-              <a:t>7/1/2016</a:t>
+              <a:t>9/26/2016</a:t>
             </a:fld>
             <a:endParaRPr lang="en-US"/>
           </a:p>
@@ -882,31 +883,7 @@
                 <a:ea typeface="+mn-ea"/>
                 <a:cs typeface="+mn-cs"/>
               </a:rPr>
-              <a:t>For example a firmware project may provide a communication stack. And since the communication can be encrypted already in the communication stack you use I/O drivers that execute in non-secure state. This allows you to configure the I/O channel as needed for your application while benefiting from a standardized and temper resistant communication stack. The secure state provides also a completely independent </a:t>
-            </a:r>
-            <a:r>
-              <a:rPr lang="en-US" sz="1200" b="0" kern="1200" baseline="0" dirty="0" err="1" smtClean="0">
-                <a:solidFill>
-                  <a:schemeClr val="tx1"/>
-                </a:solidFill>
-                <a:effectLst/>
-                <a:latin typeface="+mn-lt"/>
-                <a:ea typeface="+mn-ea"/>
-                <a:cs typeface="+mn-cs"/>
-              </a:rPr>
-              <a:t>SysTick</a:t>
-            </a:r>
-            <a:r>
-              <a:rPr lang="en-US" sz="1200" b="0" kern="1200" baseline="0" dirty="0" smtClean="0">
-                <a:solidFill>
-                  <a:schemeClr val="tx1"/>
-                </a:solidFill>
-                <a:effectLst/>
-                <a:latin typeface="+mn-lt"/>
-                <a:ea typeface="+mn-ea"/>
-                <a:cs typeface="+mn-cs"/>
-              </a:rPr>
-              <a:t> timer which you may used to diagnose error conditions in the user application or the peripherals. The secure state has full access to the non-secure state which may be used to restart a crashed user application or bring it back into a safe operating mode.</a:t>
+              <a:t>For example a firmware project may provide a communication stack. And since the communication can be encrypted already in the communication stack you use I/O drivers that execute in non-secure state. This allows you to configure the I/O channel as needed for your application while benefiting from a standardized and temper resistant communication stack. The secure state provides also a completely independent SysTick timer which you may used to diagnose error conditions in the user application or the peripherals. The secure state has full access to the non-secure state which may be used to restart a crashed user application or bring it back into a safe operating mode.</a:t>
             </a:r>
           </a:p>
           <a:p>
@@ -1073,6 +1050,115 @@
             <a:fld id="{15C21F19-84A7-D347-9BFC-DB9F02D4494D}" type="slidenum">
               <a:rPr lang="en-US" smtClean="0"/>
               <a:t>4</a:t>
+            </a:fld>
+            <a:endParaRPr lang="en-US"/>
+          </a:p>
+        </p:txBody>
+      </p:sp>
+    </p:spTree>
+    <p:extLst>
+      <p:ext uri="{BB962C8B-B14F-4D97-AF65-F5344CB8AC3E}">
+        <p14:creationId xmlns:p14="http://schemas.microsoft.com/office/powerpoint/2010/main" val="2378682332"/>
+      </p:ext>
+    </p:extLst>
+  </p:cSld>
+  <p:clrMapOvr>
+    <a:masterClrMapping/>
+  </p:clrMapOvr>
+</p:notes>
+</file>
+
+<file path=ppt/notesSlides/notesSlide3.xml><?xml version="1.0" encoding="utf-8"?>
+<p:notes xmlns:a="http://schemas.openxmlformats.org/drawingml/2006/main" xmlns:r="http://schemas.openxmlformats.org/officeDocument/2006/relationships" xmlns:p="http://schemas.openxmlformats.org/presentationml/2006/main">
+  <p:cSld>
+    <p:spTree>
+      <p:nvGrpSpPr>
+        <p:cNvPr id="1" name=""/>
+        <p:cNvGrpSpPr/>
+        <p:nvPr/>
+      </p:nvGrpSpPr>
+      <p:grpSpPr>
+        <a:xfrm>
+          <a:off x="0" y="0"/>
+          <a:ext cx="0" cy="0"/>
+          <a:chOff x="0" y="0"/>
+          <a:chExt cx="0" cy="0"/>
+        </a:xfrm>
+      </p:grpSpPr>
+      <p:sp>
+        <p:nvSpPr>
+          <p:cNvPr id="2" name="Slide Image Placeholder 1"/>
+          <p:cNvSpPr>
+            <a:spLocks noGrp="1" noRot="1" noChangeAspect="1"/>
+          </p:cNvSpPr>
+          <p:nvPr>
+            <p:ph type="sldImg"/>
+          </p:nvPr>
+        </p:nvSpPr>
+        <p:spPr/>
+      </p:sp>
+      <p:sp>
+        <p:nvSpPr>
+          <p:cNvPr id="3" name="Notes Placeholder 2"/>
+          <p:cNvSpPr>
+            <a:spLocks noGrp="1"/>
+          </p:cNvSpPr>
+          <p:nvPr>
+            <p:ph type="body" idx="1"/>
+          </p:nvPr>
+        </p:nvSpPr>
+        <p:spPr/>
+        <p:txBody>
+          <a:bodyPr/>
+          <a:lstStyle/>
+          <a:p>
+            <a:r>
+              <a:rPr lang="en-US" dirty="0" smtClean="0"/>
+              <a:t>Let us take a quick look to the Registers. You have the R0-R15</a:t>
+            </a:r>
+            <a:r>
+              <a:rPr lang="en-US" baseline="0" dirty="0" smtClean="0"/>
+              <a:t> that you know from any other ARM architecture.</a:t>
+            </a:r>
+          </a:p>
+          <a:p>
+            <a:endParaRPr lang="en-US" baseline="0" dirty="0" smtClean="0"/>
+          </a:p>
+          <a:p>
+            <a:r>
+              <a:rPr lang="en-US" baseline="0" dirty="0" smtClean="0"/>
+              <a:t>In the Non Secure state, there are two different stack pointers, but there are also new limit registers that trap stack overflows. And the Secure state has again separate stack pointers for Thread and Handler mode.</a:t>
+            </a:r>
+          </a:p>
+          <a:p>
+            <a:endParaRPr lang="en-US" baseline="0" dirty="0" smtClean="0"/>
+          </a:p>
+          <a:p>
+            <a:r>
+              <a:rPr lang="en-US" baseline="0" dirty="0" smtClean="0"/>
+              <a:t>The access for these interrupt control registers can be configured. You decide if the non-secure state can modify the execution priority or can disable all interrupts.</a:t>
+            </a:r>
+          </a:p>
+        </p:txBody>
+      </p:sp>
+      <p:sp>
+        <p:nvSpPr>
+          <p:cNvPr id="4" name="Slide Number Placeholder 3"/>
+          <p:cNvSpPr>
+            <a:spLocks noGrp="1"/>
+          </p:cNvSpPr>
+          <p:nvPr>
+            <p:ph type="sldNum" sz="quarter" idx="10"/>
+          </p:nvPr>
+        </p:nvSpPr>
+        <p:spPr/>
+        <p:txBody>
+          <a:bodyPr/>
+          <a:lstStyle/>
+          <a:p>
+            <a:fld id="{15C21F19-84A7-D347-9BFC-DB9F02D4494D}" type="slidenum">
+              <a:rPr lang="en-US" smtClean="0"/>
+              <a:t>6</a:t>
             </a:fld>
             <a:endParaRPr lang="en-US"/>
           </a:p>
@@ -14392,6 +14478,639 @@
     <p:extLst>
       <p:ext uri="{BB962C8B-B14F-4D97-AF65-F5344CB8AC3E}">
         <p14:creationId xmlns:p14="http://schemas.microsoft.com/office/powerpoint/2010/main" val="630451732"/>
+      </p:ext>
+    </p:extLst>
+  </p:cSld>
+  <p:clrMapOvr>
+    <a:masterClrMapping/>
+  </p:clrMapOvr>
+  <p:timing>
+    <p:tnLst>
+      <p:par>
+        <p:cTn id="1" dur="indefinite" restart="never" nodeType="tmRoot"/>
+      </p:par>
+    </p:tnLst>
+  </p:timing>
+</p:sld>
+</file>
+
+<file path=ppt/slides/slide6.xml><?xml version="1.0" encoding="utf-8"?>
+<p:sld xmlns:a="http://schemas.openxmlformats.org/drawingml/2006/main" xmlns:r="http://schemas.openxmlformats.org/officeDocument/2006/relationships" xmlns:p="http://schemas.openxmlformats.org/presentationml/2006/main">
+  <p:cSld>
+    <p:spTree>
+      <p:nvGrpSpPr>
+        <p:cNvPr id="1" name=""/>
+        <p:cNvGrpSpPr/>
+        <p:nvPr/>
+      </p:nvGrpSpPr>
+      <p:grpSpPr>
+        <a:xfrm>
+          <a:off x="0" y="0"/>
+          <a:ext cx="0" cy="0"/>
+          <a:chOff x="0" y="0"/>
+          <a:chExt cx="0" cy="0"/>
+        </a:xfrm>
+      </p:grpSpPr>
+      <p:sp>
+        <p:nvSpPr>
+          <p:cNvPr id="2" name="Title 1"/>
+          <p:cNvSpPr>
+            <a:spLocks noGrp="1"/>
+          </p:cNvSpPr>
+          <p:nvPr>
+            <p:ph type="title"/>
+          </p:nvPr>
+        </p:nvSpPr>
+        <p:spPr>
+          <a:xfrm>
+            <a:off x="614431" y="358341"/>
+            <a:ext cx="10133095" cy="558487"/>
+          </a:xfrm>
+        </p:spPr>
+        <p:txBody>
+          <a:bodyPr>
+            <a:normAutofit fontScale="90000"/>
+          </a:bodyPr>
+          <a:lstStyle/>
+          <a:p>
+            <a:r>
+              <a:rPr lang="en-US" dirty="0"/>
+              <a:t>ARMv8-M CMSIS-RTOS </a:t>
+            </a:r>
+            <a:r>
+              <a:rPr lang="en-US" dirty="0" smtClean="0"/>
+              <a:t>Scheduler – Concept</a:t>
+            </a:r>
+            <a:endParaRPr lang="en-US" dirty="0"/>
+          </a:p>
+        </p:txBody>
+      </p:sp>
+      <p:sp>
+        <p:nvSpPr>
+          <p:cNvPr id="4" name="TextBox 3"/>
+          <p:cNvSpPr txBox="1"/>
+          <p:nvPr/>
+        </p:nvSpPr>
+        <p:spPr>
+          <a:xfrm>
+            <a:off x="614431" y="4348639"/>
+            <a:ext cx="5807193" cy="1799120"/>
+          </a:xfrm>
+          <a:prstGeom prst="rect">
+            <a:avLst/>
+          </a:prstGeom>
+        </p:spPr>
+        <p:txBody>
+          <a:bodyPr vert="horz" wrap="square" lIns="0" tIns="0" rIns="0" bIns="0" rtlCol="0" anchor="t">
+            <a:normAutofit fontScale="92500" lnSpcReduction="10000"/>
+          </a:bodyPr>
+          <a:lstStyle/>
+          <a:p>
+            <a:pPr marL="226435" indent="-226435">
+              <a:buClr>
+                <a:schemeClr val="accent1"/>
+              </a:buClr>
+              <a:buFont typeface="Wingdings" panose="05000000000000000000" pitchFamily="2" charset="2"/>
+              <a:buChar char="§"/>
+              <a:tabLst>
+                <a:tab pos="226435" algn="l"/>
+              </a:tabLst>
+            </a:pPr>
+            <a:r>
+              <a:rPr lang="en-US" sz="2300" dirty="0">
+                <a:latin typeface="Gill Sans MT"/>
+              </a:rPr>
+              <a:t>Split RTOS into Secure/Non-Secure part</a:t>
+            </a:r>
+            <a:br>
+              <a:rPr lang="en-US" sz="2300" dirty="0">
+                <a:latin typeface="Gill Sans MT"/>
+              </a:rPr>
+            </a:br>
+            <a:endParaRPr lang="en-US" sz="2300" dirty="0">
+              <a:latin typeface="Gill Sans MT"/>
+            </a:endParaRPr>
+          </a:p>
+          <a:p>
+            <a:pPr marL="226435" indent="-226435">
+              <a:buClr>
+                <a:schemeClr val="accent1"/>
+              </a:buClr>
+              <a:buFont typeface="Wingdings" panose="05000000000000000000" pitchFamily="2" charset="2"/>
+              <a:buChar char="§"/>
+              <a:tabLst>
+                <a:tab pos="226435" algn="l"/>
+              </a:tabLst>
+            </a:pPr>
+            <a:r>
+              <a:rPr lang="en-US" sz="2300" dirty="0">
+                <a:latin typeface="Gill Sans MT"/>
+              </a:rPr>
+              <a:t>Allow calls to software that runs in Secure State</a:t>
+            </a:r>
+          </a:p>
+          <a:p>
+            <a:pPr marL="226435" indent="-226435">
+              <a:buClr>
+                <a:schemeClr val="accent1"/>
+              </a:buClr>
+              <a:tabLst>
+                <a:tab pos="226435" algn="l"/>
+              </a:tabLst>
+            </a:pPr>
+            <a:endParaRPr lang="en-US" sz="2300" dirty="0">
+              <a:latin typeface="Gill Sans MT"/>
+            </a:endParaRPr>
+          </a:p>
+          <a:p>
+            <a:pPr marL="226435" indent="-226435">
+              <a:buClr>
+                <a:schemeClr val="accent1"/>
+              </a:buClr>
+              <a:buFont typeface="Wingdings" panose="05000000000000000000" pitchFamily="2" charset="2"/>
+              <a:buChar char="§"/>
+              <a:tabLst>
+                <a:tab pos="226435" algn="l"/>
+              </a:tabLst>
+            </a:pPr>
+            <a:r>
+              <a:rPr lang="en-US" sz="2300" dirty="0">
+                <a:latin typeface="Gill Sans MT"/>
+              </a:rPr>
+              <a:t>Allow callbacks from RTOS_S to RTOS_NS</a:t>
+            </a:r>
+          </a:p>
+          <a:p>
+            <a:r>
+              <a:rPr lang="en-US" dirty="0"/>
+              <a:t> </a:t>
+            </a:r>
+            <a:endParaRPr lang="en-GB" dirty="0" smtClean="0"/>
+          </a:p>
+        </p:txBody>
+      </p:sp>
+      <p:sp>
+        <p:nvSpPr>
+          <p:cNvPr id="5" name="TextBox 4"/>
+          <p:cNvSpPr txBox="1"/>
+          <p:nvPr/>
+        </p:nvSpPr>
+        <p:spPr>
+          <a:xfrm>
+            <a:off x="3215391" y="1636135"/>
+            <a:ext cx="914400" cy="914400"/>
+          </a:xfrm>
+          <a:prstGeom prst="rect">
+            <a:avLst/>
+          </a:prstGeom>
+        </p:spPr>
+        <p:txBody>
+          <a:bodyPr vert="horz" wrap="none" lIns="0" tIns="0" rIns="0" bIns="0" rtlCol="0" anchor="t">
+            <a:normAutofit/>
+          </a:bodyPr>
+          <a:lstStyle/>
+          <a:p>
+            <a:endParaRPr lang="en-GB" dirty="0" smtClean="0"/>
+          </a:p>
+        </p:txBody>
+      </p:sp>
+      <p:sp>
+        <p:nvSpPr>
+          <p:cNvPr id="23" name="Rectangle 22"/>
+          <p:cNvSpPr/>
+          <p:nvPr/>
+        </p:nvSpPr>
+        <p:spPr>
+          <a:xfrm>
+            <a:off x="1207995" y="1756205"/>
+            <a:ext cx="4029024" cy="2063111"/>
+          </a:xfrm>
+          <a:prstGeom prst="rect">
+            <a:avLst/>
+          </a:prstGeom>
+          <a:solidFill>
+            <a:schemeClr val="accent1">
+              <a:lumMod val="20000"/>
+              <a:lumOff val="80000"/>
+            </a:schemeClr>
+          </a:solidFill>
+          <a:ln>
+            <a:solidFill>
+              <a:schemeClr val="accent1"/>
+            </a:solidFill>
+          </a:ln>
+          <a:effectLst/>
+        </p:spPr>
+        <p:style>
+          <a:lnRef idx="1">
+            <a:schemeClr val="accent1"/>
+          </a:lnRef>
+          <a:fillRef idx="3">
+            <a:schemeClr val="accent1"/>
+          </a:fillRef>
+          <a:effectRef idx="2">
+            <a:schemeClr val="accent1"/>
+          </a:effectRef>
+          <a:fontRef idx="minor">
+            <a:schemeClr val="lt1"/>
+          </a:fontRef>
+        </p:style>
+        <p:txBody>
+          <a:bodyPr lIns="91432" tIns="45717" rIns="91432" bIns="45717" rtlCol="0" anchor="ctr"/>
+          <a:lstStyle/>
+          <a:p>
+            <a:r>
+              <a:rPr lang="en-US" sz="1900" b="1" dirty="0" smtClean="0">
+                <a:solidFill>
+                  <a:schemeClr val="tx1"/>
+                </a:solidFill>
+              </a:rPr>
+              <a:t>RTOS (non secure part)</a:t>
+            </a:r>
+            <a:br>
+              <a:rPr lang="en-US" sz="1900" b="1" dirty="0" smtClean="0">
+                <a:solidFill>
+                  <a:schemeClr val="tx1"/>
+                </a:solidFill>
+              </a:rPr>
+            </a:br>
+            <a:endParaRPr lang="en-US" sz="1400" b="1" dirty="0" smtClean="0">
+              <a:solidFill>
+                <a:schemeClr val="tx1"/>
+              </a:solidFill>
+            </a:endParaRPr>
+          </a:p>
+          <a:p>
+            <a:r>
+              <a:rPr lang="en-US" sz="1900" b="1" dirty="0">
+                <a:solidFill>
+                  <a:schemeClr val="tx1"/>
+                </a:solidFill>
+              </a:rPr>
+              <a:t> </a:t>
+            </a:r>
+            <a:r>
+              <a:rPr lang="en-US" sz="1900" b="1" dirty="0" smtClean="0">
+                <a:solidFill>
+                  <a:schemeClr val="tx1"/>
+                </a:solidFill>
+              </a:rPr>
+              <a:t> - </a:t>
+            </a:r>
+            <a:r>
+              <a:rPr lang="en-US" sz="1900" dirty="0" smtClean="0">
+                <a:solidFill>
+                  <a:schemeClr val="tx1"/>
+                </a:solidFill>
+              </a:rPr>
+              <a:t>RTOS API functions</a:t>
+            </a:r>
+            <a:r>
+              <a:rPr lang="en-US" sz="1900" dirty="0">
+                <a:solidFill>
+                  <a:schemeClr val="tx1"/>
+                </a:solidFill>
+              </a:rPr>
+              <a:t/>
+            </a:r>
+            <a:br>
+              <a:rPr lang="en-US" sz="1900" dirty="0">
+                <a:solidFill>
+                  <a:schemeClr val="tx1"/>
+                </a:solidFill>
+              </a:rPr>
+            </a:br>
+            <a:r>
+              <a:rPr lang="en-US" sz="1900" dirty="0" smtClean="0">
+                <a:solidFill>
+                  <a:schemeClr val="tx1"/>
+                </a:solidFill>
+              </a:rPr>
+              <a:t>  - Scheduler with SysTick Handler</a:t>
+            </a:r>
+          </a:p>
+          <a:p>
+            <a:r>
+              <a:rPr lang="en-US" sz="1900" dirty="0">
+                <a:solidFill>
+                  <a:schemeClr val="tx1"/>
+                </a:solidFill>
+              </a:rPr>
+              <a:t> </a:t>
+            </a:r>
+            <a:r>
+              <a:rPr lang="en-US" sz="1900" dirty="0" smtClean="0">
+                <a:solidFill>
+                  <a:schemeClr val="tx1"/>
+                </a:solidFill>
+              </a:rPr>
+              <a:t> - Resource handling for non-secure  </a:t>
+            </a:r>
+            <a:br>
+              <a:rPr lang="en-US" sz="1900" dirty="0" smtClean="0">
+                <a:solidFill>
+                  <a:schemeClr val="tx1"/>
+                </a:solidFill>
+              </a:rPr>
+            </a:br>
+            <a:r>
+              <a:rPr lang="en-US" sz="1900" dirty="0" smtClean="0">
+                <a:solidFill>
+                  <a:schemeClr val="tx1"/>
+                </a:solidFill>
+              </a:rPr>
+              <a:t>    objects</a:t>
+            </a:r>
+            <a:endParaRPr lang="en-US" sz="1900" dirty="0">
+              <a:solidFill>
+                <a:schemeClr val="tx1"/>
+              </a:solidFill>
+            </a:endParaRPr>
+          </a:p>
+        </p:txBody>
+      </p:sp>
+      <p:sp>
+        <p:nvSpPr>
+          <p:cNvPr id="52" name="Rectangle 51"/>
+          <p:cNvSpPr/>
+          <p:nvPr/>
+        </p:nvSpPr>
+        <p:spPr>
+          <a:xfrm>
+            <a:off x="6421620" y="1756205"/>
+            <a:ext cx="4117182" cy="2063111"/>
+          </a:xfrm>
+          <a:prstGeom prst="rect">
+            <a:avLst/>
+          </a:prstGeom>
+          <a:solidFill>
+            <a:schemeClr val="accent2">
+              <a:lumMod val="40000"/>
+              <a:lumOff val="60000"/>
+            </a:schemeClr>
+          </a:solidFill>
+          <a:ln>
+            <a:solidFill>
+              <a:schemeClr val="accent1"/>
+            </a:solidFill>
+          </a:ln>
+          <a:effectLst/>
+        </p:spPr>
+        <p:style>
+          <a:lnRef idx="1">
+            <a:schemeClr val="accent1"/>
+          </a:lnRef>
+          <a:fillRef idx="3">
+            <a:schemeClr val="accent1"/>
+          </a:fillRef>
+          <a:effectRef idx="2">
+            <a:schemeClr val="accent1"/>
+          </a:effectRef>
+          <a:fontRef idx="minor">
+            <a:schemeClr val="lt1"/>
+          </a:fontRef>
+        </p:style>
+        <p:txBody>
+          <a:bodyPr lIns="91432" tIns="45717" rIns="91432" bIns="45717" rtlCol="0" anchor="ctr"/>
+          <a:lstStyle/>
+          <a:p>
+            <a:r>
+              <a:rPr lang="en-US" sz="1900" b="1" dirty="0" smtClean="0">
+                <a:solidFill>
+                  <a:schemeClr val="tx1"/>
+                </a:solidFill>
+              </a:rPr>
+              <a:t>TZ_context (secure part)</a:t>
+            </a:r>
+          </a:p>
+          <a:p>
+            <a:endParaRPr lang="en-US" sz="1400" b="1" dirty="0">
+              <a:solidFill>
+                <a:schemeClr val="tx1"/>
+              </a:solidFill>
+            </a:endParaRPr>
+          </a:p>
+          <a:p>
+            <a:r>
+              <a:rPr lang="en-US" sz="1900" dirty="0" smtClean="0">
+                <a:solidFill>
+                  <a:schemeClr val="tx1"/>
+                </a:solidFill>
+              </a:rPr>
+              <a:t>  - Called only by </a:t>
+            </a:r>
+            <a:r>
+              <a:rPr lang="en-US" sz="1900" b="1" dirty="0" smtClean="0">
+                <a:solidFill>
+                  <a:schemeClr val="tx1"/>
+                </a:solidFill>
+              </a:rPr>
+              <a:t>RTOS_NS</a:t>
+            </a:r>
+          </a:p>
+          <a:p>
+            <a:r>
+              <a:rPr lang="en-US" sz="1900" dirty="0" smtClean="0">
+                <a:solidFill>
+                  <a:schemeClr val="tx1"/>
+                </a:solidFill>
+              </a:rPr>
+              <a:t>  - Context switch </a:t>
+            </a:r>
+            <a:r>
+              <a:rPr lang="en-US" sz="1900" dirty="0">
+                <a:solidFill>
+                  <a:schemeClr val="tx1"/>
+                </a:solidFill>
+              </a:rPr>
+              <a:t>to handle </a:t>
+            </a:r>
+            <a:r>
+              <a:rPr lang="en-US" sz="1900" dirty="0" smtClean="0">
+                <a:solidFill>
+                  <a:schemeClr val="tx1"/>
+                </a:solidFill>
+              </a:rPr>
+              <a:t>secure|</a:t>
+            </a:r>
+            <a:br>
+              <a:rPr lang="en-US" sz="1900" dirty="0" smtClean="0">
+                <a:solidFill>
+                  <a:schemeClr val="tx1"/>
+                </a:solidFill>
+              </a:rPr>
+            </a:br>
+            <a:r>
+              <a:rPr lang="en-US" sz="1900" dirty="0" smtClean="0">
+                <a:solidFill>
+                  <a:schemeClr val="tx1"/>
+                </a:solidFill>
+              </a:rPr>
+              <a:t>    </a:t>
+            </a:r>
+            <a:r>
+              <a:rPr lang="en-US" sz="1900" dirty="0">
+                <a:solidFill>
+                  <a:schemeClr val="tx1"/>
+                </a:solidFill>
+              </a:rPr>
+              <a:t>state </a:t>
+            </a:r>
+            <a:r>
+              <a:rPr lang="en-US" sz="1900" dirty="0" smtClean="0">
+                <a:solidFill>
+                  <a:schemeClr val="tx1"/>
+                </a:solidFill>
+              </a:rPr>
+              <a:t>registers</a:t>
+            </a:r>
+            <a:br>
+              <a:rPr lang="en-US" sz="1900" dirty="0" smtClean="0">
+                <a:solidFill>
+                  <a:schemeClr val="tx1"/>
+                </a:solidFill>
+              </a:rPr>
+            </a:br>
+            <a:r>
+              <a:rPr lang="en-US" sz="1900" dirty="0" smtClean="0">
+                <a:solidFill>
+                  <a:schemeClr val="tx1"/>
+                </a:solidFill>
+              </a:rPr>
+              <a:t>  - Manages thread stack (PSP_S)</a:t>
+            </a:r>
+            <a:endParaRPr lang="en-GB" sz="1900" dirty="0">
+              <a:solidFill>
+                <a:schemeClr val="tx1"/>
+              </a:solidFill>
+            </a:endParaRPr>
+          </a:p>
+        </p:txBody>
+      </p:sp>
+      <p:cxnSp>
+        <p:nvCxnSpPr>
+          <p:cNvPr id="28" name="Straight Arrow Connector 27"/>
+          <p:cNvCxnSpPr/>
+          <p:nvPr/>
+        </p:nvCxnSpPr>
+        <p:spPr>
+          <a:xfrm>
+            <a:off x="5237020" y="2787760"/>
+            <a:ext cx="1184603" cy="0"/>
+          </a:xfrm>
+          <a:prstGeom prst="straightConnector1">
+            <a:avLst/>
+          </a:prstGeom>
+          <a:ln>
+            <a:tailEnd type="arrow"/>
+          </a:ln>
+        </p:spPr>
+        <p:style>
+          <a:lnRef idx="2">
+            <a:schemeClr val="accent1"/>
+          </a:lnRef>
+          <a:fillRef idx="0">
+            <a:schemeClr val="accent1"/>
+          </a:fillRef>
+          <a:effectRef idx="1">
+            <a:schemeClr val="accent1"/>
+          </a:effectRef>
+          <a:fontRef idx="minor">
+            <a:schemeClr val="tx1"/>
+          </a:fontRef>
+        </p:style>
+      </p:cxnSp>
+      <p:sp>
+        <p:nvSpPr>
+          <p:cNvPr id="11" name="TextBox 10"/>
+          <p:cNvSpPr txBox="1"/>
+          <p:nvPr/>
+        </p:nvSpPr>
+        <p:spPr>
+          <a:xfrm>
+            <a:off x="6421620" y="1215494"/>
+            <a:ext cx="4117182" cy="420641"/>
+          </a:xfrm>
+          <a:prstGeom prst="rect">
+            <a:avLst/>
+          </a:prstGeom>
+          <a:solidFill>
+            <a:schemeClr val="accent2"/>
+          </a:solidFill>
+        </p:spPr>
+        <p:style>
+          <a:lnRef idx="3">
+            <a:schemeClr val="lt1"/>
+          </a:lnRef>
+          <a:fillRef idx="1">
+            <a:schemeClr val="accent2"/>
+          </a:fillRef>
+          <a:effectRef idx="1">
+            <a:schemeClr val="accent2"/>
+          </a:effectRef>
+          <a:fontRef idx="minor">
+            <a:schemeClr val="lt1"/>
+          </a:fontRef>
+        </p:style>
+        <p:txBody>
+          <a:bodyPr wrap="square" lIns="91436" tIns="45719" rIns="91436" bIns="45719" rtlCol="0">
+            <a:spAutoFit/>
+          </a:bodyPr>
+          <a:lstStyle/>
+          <a:p>
+            <a:r>
+              <a:rPr lang="en-GB" sz="2100" dirty="0"/>
+              <a:t>Secure state</a:t>
+            </a:r>
+          </a:p>
+        </p:txBody>
+      </p:sp>
+      <p:sp>
+        <p:nvSpPr>
+          <p:cNvPr id="12" name="TextBox 11"/>
+          <p:cNvSpPr txBox="1"/>
+          <p:nvPr/>
+        </p:nvSpPr>
+        <p:spPr>
+          <a:xfrm>
+            <a:off x="1207995" y="1215494"/>
+            <a:ext cx="4029024" cy="420641"/>
+          </a:xfrm>
+          <a:prstGeom prst="rect">
+            <a:avLst/>
+          </a:prstGeom>
+        </p:spPr>
+        <p:style>
+          <a:lnRef idx="3">
+            <a:schemeClr val="lt1"/>
+          </a:lnRef>
+          <a:fillRef idx="1">
+            <a:schemeClr val="accent1"/>
+          </a:fillRef>
+          <a:effectRef idx="1">
+            <a:schemeClr val="accent1"/>
+          </a:effectRef>
+          <a:fontRef idx="minor">
+            <a:schemeClr val="lt1"/>
+          </a:fontRef>
+        </p:style>
+        <p:txBody>
+          <a:bodyPr wrap="square" lIns="91436" tIns="45719" rIns="91436" bIns="45719" rtlCol="0">
+            <a:spAutoFit/>
+          </a:bodyPr>
+          <a:lstStyle/>
+          <a:p>
+            <a:r>
+              <a:rPr lang="en-GB" sz="2100" dirty="0"/>
+              <a:t>Non-secure state</a:t>
+            </a:r>
+          </a:p>
+        </p:txBody>
+      </p:sp>
+    </p:spTree>
+    <p:extLst>
+      <p:ext uri="{BB962C8B-B14F-4D97-AF65-F5344CB8AC3E}">
+        <p14:creationId xmlns:p14="http://schemas.microsoft.com/office/powerpoint/2010/main" val="3342152065"/>
       </p:ext>
     </p:extLst>
   </p:cSld>
@@ -15386,6 +16105,21 @@
 </file>
 
 <file path=customXml/item1.xml><?xml version="1.0" encoding="utf-8"?>
+<p:properties xmlns:p="http://schemas.microsoft.com/office/2006/metadata/properties" xmlns:xsi="http://www.w3.org/2001/XMLSchema-instance">
+  <documentManagement/>
+</p:properties>
+</file>
+
+<file path=customXml/item2.xml><?xml version="1.0" encoding="utf-8"?>
+<?mso-contentType ?>
+<FormTemplates xmlns="http://schemas.microsoft.com/sharepoint/v3/contenttype/forms">
+  <Display>DocumentLibraryForm</Display>
+  <Edit>DocumentLibraryForm</Edit>
+  <New>DocumentLibraryForm</New>
+</FormTemplates>
+</file>
+
+<file path=customXml/item3.xml><?xml version="1.0" encoding="utf-8"?>
 <ct:contentTypeSchema xmlns:ct="http://schemas.microsoft.com/office/2006/metadata/contentType" xmlns:ma="http://schemas.microsoft.com/office/2006/metadata/properties/metaAttributes" ct:_="" ma:_="" ma:contentTypeName="Document" ma:contentTypeID="0x010100CAE3FC6E4566A44694FF6BF40EC1C126" ma:contentTypeVersion="0" ma:contentTypeDescription="Create a new document." ma:contentTypeScope="" ma:versionID="0c5b8ba185a47c7168257d800a15637f">
   <xsd:schema xmlns:xsd="http://www.w3.org/2001/XMLSchema" xmlns:xs="http://www.w3.org/2001/XMLSchema" xmlns:p="http://schemas.microsoft.com/office/2006/metadata/properties" targetNamespace="http://schemas.microsoft.com/office/2006/metadata/properties" ma:root="true" ma:fieldsID="c64490b4aec6201516c3a874156f37b2">
     <xsd:element name="properties">
@@ -15499,22 +16233,30 @@
 </ct:contentTypeSchema>
 </file>
 
-<file path=customXml/item2.xml><?xml version="1.0" encoding="utf-8"?>
-<?mso-contentType ?>
-<FormTemplates xmlns="http://schemas.microsoft.com/sharepoint/v3/contenttype/forms">
-  <Display>DocumentLibraryForm</Display>
-  <Edit>DocumentLibraryForm</Edit>
-  <New>DocumentLibraryForm</New>
-</FormTemplates>
+<file path=customXml/itemProps1.xml><?xml version="1.0" encoding="utf-8"?>
+<ds:datastoreItem xmlns:ds="http://schemas.openxmlformats.org/officeDocument/2006/customXml" ds:itemID="{AE6E82D6-7FB8-4D99-A7B6-3C5BB1D894B9}">
+  <ds:schemaRefs>
+    <ds:schemaRef ds:uri="http://purl.org/dc/terms/"/>
+    <ds:schemaRef ds:uri="http://www.w3.org/XML/1998/namespace"/>
+    <ds:schemaRef ds:uri="http://purl.org/dc/dcmitype/"/>
+    <ds:schemaRef ds:uri="http://schemas.microsoft.com/office/2006/documentManagement/types"/>
+    <ds:schemaRef ds:uri="http://purl.org/dc/elements/1.1/"/>
+    <ds:schemaRef ds:uri="http://schemas.microsoft.com/office/2006/metadata/properties"/>
+    <ds:schemaRef ds:uri="http://schemas.microsoft.com/office/infopath/2007/PartnerControls"/>
+    <ds:schemaRef ds:uri="http://schemas.openxmlformats.org/package/2006/metadata/core-properties"/>
+  </ds:schemaRefs>
+</ds:datastoreItem>
 </file>
 
-<file path=customXml/item3.xml><?xml version="1.0" encoding="utf-8"?>
-<p:properties xmlns:p="http://schemas.microsoft.com/office/2006/metadata/properties" xmlns:xsi="http://www.w3.org/2001/XMLSchema-instance">
-  <documentManagement/>
-</p:properties>
+<file path=customXml/itemProps2.xml><?xml version="1.0" encoding="utf-8"?>
+<ds:datastoreItem xmlns:ds="http://schemas.openxmlformats.org/officeDocument/2006/customXml" ds:itemID="{9C777C69-0744-4BF3-8514-FB149EBD2248}">
+  <ds:schemaRefs>
+    <ds:schemaRef ds:uri="http://schemas.microsoft.com/sharepoint/v3/contenttype/forms"/>
+  </ds:schemaRefs>
+</ds:datastoreItem>
 </file>
 
-<file path=customXml/itemProps1.xml><?xml version="1.0" encoding="utf-8"?>
+<file path=customXml/itemProps3.xml><?xml version="1.0" encoding="utf-8"?>
 <ds:datastoreItem xmlns:ds="http://schemas.openxmlformats.org/officeDocument/2006/customXml" ds:itemID="{FD99A681-1CE7-4872-A113-126DF10B3AAF}">
   <ds:schemaRefs>
     <ds:schemaRef ds:uri="http://schemas.microsoft.com/office/2006/metadata/contentType"/>
@@ -15528,27 +16270,4 @@
     <ds:schemaRef ds:uri="http://schemas.microsoft.com/office/infopath/2007/PartnerControls"/>
   </ds:schemaRefs>
 </ds:datastoreItem>
-</file>
-
-<file path=customXml/itemProps2.xml><?xml version="1.0" encoding="utf-8"?>
-<ds:datastoreItem xmlns:ds="http://schemas.openxmlformats.org/officeDocument/2006/customXml" ds:itemID="{9C777C69-0744-4BF3-8514-FB149EBD2248}">
-  <ds:schemaRefs>
-    <ds:schemaRef ds:uri="http://schemas.microsoft.com/sharepoint/v3/contenttype/forms"/>
-  </ds:schemaRefs>
-</ds:datastoreItem>
-</file>
-
-<file path=customXml/itemProps3.xml><?xml version="1.0" encoding="utf-8"?>
-<ds:datastoreItem xmlns:ds="http://schemas.openxmlformats.org/officeDocument/2006/customXml" ds:itemID="{AE6E82D6-7FB8-4D99-A7B6-3C5BB1D894B9}">
-  <ds:schemaRefs>
-    <ds:schemaRef ds:uri="http://schemas.openxmlformats.org/package/2006/metadata/core-properties"/>
-    <ds:schemaRef ds:uri="http://www.w3.org/XML/1998/namespace"/>
-    <ds:schemaRef ds:uri="http://purl.org/dc/elements/1.1/"/>
-    <ds:schemaRef ds:uri="http://schemas.microsoft.com/office/2006/documentManagement/types"/>
-    <ds:schemaRef ds:uri="http://purl.org/dc/terms/"/>
-    <ds:schemaRef ds:uri="http://schemas.microsoft.com/office/infopath/2007/PartnerControls"/>
-    <ds:schemaRef ds:uri="http://schemas.microsoft.com/office/2006/metadata/properties"/>
-    <ds:schemaRef ds:uri="http://purl.org/dc/dcmitype/"/>
-  </ds:schemaRefs>
-</ds:datastoreItem>
 </file>
</xml_diff>

<commit_message>
Updated file list image
</commit_message>
<xml_diff>
--- a/CMSIS/DoxyGen/Core/src/images/ARMv8-M_images.pptx
+++ b/CMSIS/DoxyGen/Core/src/images/ARMv8-M_images.pptx
@@ -6,10 +6,10 @@
     <p:sldMasterId id="2147483731" r:id="rId5"/>
   </p:sldMasterIdLst>
   <p:notesMasterIdLst>
-    <p:notesMasterId r:id="rId18"/>
+    <p:notesMasterId r:id="rId19"/>
   </p:notesMasterIdLst>
   <p:handoutMasterIdLst>
-    <p:handoutMasterId r:id="rId19"/>
+    <p:handoutMasterId r:id="rId20"/>
   </p:handoutMasterIdLst>
   <p:sldIdLst>
     <p:sldId id="268" r:id="rId6"/>
@@ -24,6 +24,7 @@
     <p:sldId id="276" r:id="rId15"/>
     <p:sldId id="277" r:id="rId16"/>
     <p:sldId id="278" r:id="rId17"/>
+    <p:sldId id="279" r:id="rId18"/>
   </p:sldIdLst>
   <p:sldSz cx="12188825" cy="6858000"/>
   <p:notesSz cx="6794500" cy="9918700"/>
@@ -130,7 +131,7 @@
             <a:srgbClr val="A4A3A4"/>
           </p15:clr>
         </p15:guide>
-        <p15:guide id="2" pos="6861">
+        <p15:guide id="2" pos="6855" userDrawn="1">
           <p15:clr>
             <a:srgbClr val="A4A3A4"/>
           </p15:clr>
@@ -247,7 +248,7 @@
             <a:fld id="{E72D30EF-8F20-0B47-8B5D-39A8BC29E860}" type="datetimeFigureOut">
               <a:rPr lang="en-US" smtClean="0"/>
               <a:pPr/>
-              <a:t>2017-05-08</a:t>
+              <a:t>2/19/2020</a:t>
             </a:fld>
             <a:endParaRPr lang="en-US"/>
           </a:p>
@@ -415,7 +416,7 @@
             <a:fld id="{77EDD36E-1E02-F241-9611-1F1D9EAAD326}" type="datetimeFigureOut">
               <a:rPr lang="en-US" smtClean="0"/>
               <a:pPr/>
-              <a:t>2017-05-08</a:t>
+              <a:t>2/19/2020</a:t>
             </a:fld>
             <a:endParaRPr lang="en-US"/>
           </a:p>
@@ -19739,6 +19740,2199 @@
     <p:extLst>
       <p:ext uri="{BB962C8B-B14F-4D97-AF65-F5344CB8AC3E}">
         <p14:creationId xmlns:p14="http://schemas.microsoft.com/office/powerpoint/2010/main" val="2913101184"/>
+      </p:ext>
+    </p:extLst>
+  </p:cSld>
+  <p:clrMapOvr>
+    <a:masterClrMapping/>
+  </p:clrMapOvr>
+</p:sld>
+</file>
+
+<file path=ppt/slides/slide13.xml><?xml version="1.0" encoding="utf-8"?>
+<p:sld xmlns:a="http://schemas.openxmlformats.org/drawingml/2006/main" xmlns:r="http://schemas.openxmlformats.org/officeDocument/2006/relationships" xmlns:p="http://schemas.openxmlformats.org/presentationml/2006/main">
+  <p:cSld>
+    <p:spTree>
+      <p:nvGrpSpPr>
+        <p:cNvPr id="1" name=""/>
+        <p:cNvGrpSpPr/>
+        <p:nvPr/>
+      </p:nvGrpSpPr>
+      <p:grpSpPr>
+        <a:xfrm>
+          <a:off x="0" y="0"/>
+          <a:ext cx="0" cy="0"/>
+          <a:chOff x="0" y="0"/>
+          <a:chExt cx="0" cy="0"/>
+        </a:xfrm>
+      </p:grpSpPr>
+      <p:sp>
+        <p:nvSpPr>
+          <p:cNvPr id="8" name="Snip Single Corner Rectangle 7"/>
+          <p:cNvSpPr/>
+          <p:nvPr/>
+        </p:nvSpPr>
+        <p:spPr bwMode="auto">
+          <a:xfrm>
+            <a:off x="820738" y="1680907"/>
+            <a:ext cx="2412000" cy="936000"/>
+          </a:xfrm>
+          <a:prstGeom prst="snip1Rect">
+            <a:avLst/>
+          </a:prstGeom>
+          <a:solidFill>
+            <a:schemeClr val="accent3">
+              <a:lumMod val="20000"/>
+              <a:lumOff val="80000"/>
+            </a:schemeClr>
+          </a:solidFill>
+          <a:ln w="9525" cap="flat" cmpd="sng" algn="ctr">
+            <a:solidFill>
+              <a:schemeClr val="tx1"/>
+            </a:solidFill>
+            <a:prstDash val="solid"/>
+            <a:round/>
+            <a:headEnd type="none" w="med" len="med"/>
+            <a:tailEnd type="triangle" w="lg" len="med"/>
+          </a:ln>
+          <a:effectLst/>
+        </p:spPr>
+        <p:txBody>
+          <a:bodyPr wrap="none" anchor="t" anchorCtr="1"/>
+          <a:lstStyle/>
+          <a:p>
+            <a:pPr marL="0" marR="0" lvl="0" indent="0" algn="ctr" defTabSz="457181" rtl="0" eaLnBrk="1" fontAlgn="auto" latinLnBrk="0" hangingPunct="1">
+              <a:lnSpc>
+                <a:spcPct val="100000"/>
+              </a:lnSpc>
+              <a:spcBef>
+                <a:spcPts val="0"/>
+              </a:spcBef>
+              <a:spcAft>
+                <a:spcPts val="0"/>
+              </a:spcAft>
+              <a:buClrTx/>
+              <a:buSzTx/>
+              <a:buFontTx/>
+              <a:buNone/>
+              <a:tabLst/>
+              <a:defRPr/>
+            </a:pPr>
+            <a:r>
+              <a:rPr kumimoji="0" lang="en-US" sz="1400" b="0" i="0" u="none" strike="noStrike" kern="1200" cap="none" spc="0" normalizeH="0" baseline="0" noProof="0" dirty="0">
+                <a:ln>
+                  <a:noFill/>
+                </a:ln>
+                <a:solidFill>
+                  <a:srgbClr val="414444"/>
+                </a:solidFill>
+                <a:effectLst/>
+                <a:uLnTx/>
+                <a:uFillTx/>
+                <a:latin typeface="Courier New" panose="02070309020205020404" pitchFamily="49" charset="0"/>
+                <a:ea typeface="+mn-ea"/>
+                <a:cs typeface="Courier New" panose="02070309020205020404" pitchFamily="49" charset="0"/>
+              </a:rPr>
+              <a:t>startup_&lt;</a:t>
+            </a:r>
+            <a:r>
+              <a:rPr kumimoji="0" lang="en-US" sz="1400" b="0" i="1" u="none" strike="noStrike" kern="1200" cap="none" spc="0" normalizeH="0" baseline="0" noProof="0" dirty="0">
+                <a:ln>
+                  <a:noFill/>
+                </a:ln>
+                <a:solidFill>
+                  <a:srgbClr val="414444"/>
+                </a:solidFill>
+                <a:effectLst/>
+                <a:uLnTx/>
+                <a:uFillTx/>
+                <a:latin typeface="Courier New" panose="02070309020205020404" pitchFamily="49" charset="0"/>
+                <a:ea typeface="+mn-ea"/>
+                <a:cs typeface="Courier New" panose="02070309020205020404" pitchFamily="49" charset="0"/>
+              </a:rPr>
+              <a:t>device</a:t>
+            </a:r>
+            <a:r>
+              <a:rPr kumimoji="0" lang="en-US" sz="1400" b="0" i="0" u="none" strike="noStrike" kern="1200" cap="none" spc="0" normalizeH="0" baseline="0" noProof="0" dirty="0">
+                <a:ln>
+                  <a:noFill/>
+                </a:ln>
+                <a:solidFill>
+                  <a:srgbClr val="414444"/>
+                </a:solidFill>
+                <a:effectLst/>
+                <a:uLnTx/>
+                <a:uFillTx/>
+                <a:latin typeface="Courier New" panose="02070309020205020404" pitchFamily="49" charset="0"/>
+                <a:ea typeface="+mn-ea"/>
+                <a:cs typeface="Courier New" panose="02070309020205020404" pitchFamily="49" charset="0"/>
+              </a:rPr>
+              <a:t>&gt;.s</a:t>
+            </a:r>
+            <a:br>
+              <a:rPr kumimoji="0" lang="en-US" sz="1400" b="0" i="0" u="none" strike="noStrike" kern="1200" cap="none" spc="0" normalizeH="0" baseline="0" noProof="0" dirty="0">
+                <a:ln>
+                  <a:noFill/>
+                </a:ln>
+                <a:solidFill>
+                  <a:srgbClr val="414444"/>
+                </a:solidFill>
+                <a:effectLst/>
+                <a:uLnTx/>
+                <a:uFillTx/>
+                <a:latin typeface="Courier New" panose="02070309020205020404" pitchFamily="49" charset="0"/>
+                <a:ea typeface="+mn-ea"/>
+                <a:cs typeface="Courier New" panose="02070309020205020404" pitchFamily="49" charset="0"/>
+              </a:rPr>
+            </a:br>
+            <a:r>
+              <a:rPr kumimoji="0" lang="en-US" sz="1600" b="0" i="0" u="none" strike="noStrike" kern="1200" cap="none" spc="0" normalizeH="0" baseline="0" noProof="0" dirty="0">
+                <a:ln>
+                  <a:noFill/>
+                </a:ln>
+                <a:solidFill>
+                  <a:srgbClr val="414444"/>
+                </a:solidFill>
+                <a:effectLst/>
+                <a:uLnTx/>
+                <a:uFillTx/>
+                <a:latin typeface="Calibri" panose="020F0502020204030204" pitchFamily="34" charset="0"/>
+                <a:cs typeface="Calibri" panose="020F0502020204030204" pitchFamily="34" charset="0"/>
+              </a:rPr>
+              <a:t>CMSIS device startup</a:t>
+            </a:r>
+          </a:p>
+        </p:txBody>
+      </p:sp>
+      <p:sp>
+        <p:nvSpPr>
+          <p:cNvPr id="9" name="Snip Single Corner Rectangle 8"/>
+          <p:cNvSpPr/>
+          <p:nvPr/>
+        </p:nvSpPr>
+        <p:spPr bwMode="auto">
+          <a:xfrm>
+            <a:off x="821483" y="2796907"/>
+            <a:ext cx="2412000" cy="936000"/>
+          </a:xfrm>
+          <a:prstGeom prst="snip1Rect">
+            <a:avLst/>
+          </a:prstGeom>
+          <a:solidFill>
+            <a:srgbClr val="C5EDF8"/>
+          </a:solidFill>
+          <a:ln w="9525" cap="flat" cmpd="sng" algn="ctr">
+            <a:solidFill>
+              <a:schemeClr val="tx1"/>
+            </a:solidFill>
+            <a:prstDash val="solid"/>
+            <a:round/>
+            <a:headEnd type="none" w="med" len="med"/>
+            <a:tailEnd type="triangle" w="lg" len="med"/>
+          </a:ln>
+          <a:effectLst/>
+        </p:spPr>
+        <p:txBody>
+          <a:bodyPr wrap="none" anchor="t" anchorCtr="1"/>
+          <a:lstStyle/>
+          <a:p>
+            <a:pPr marL="0" marR="0" lvl="0" indent="0" algn="ctr" defTabSz="457181" rtl="0" eaLnBrk="1" fontAlgn="auto" latinLnBrk="0" hangingPunct="1">
+              <a:lnSpc>
+                <a:spcPct val="100000"/>
+              </a:lnSpc>
+              <a:spcBef>
+                <a:spcPts val="0"/>
+              </a:spcBef>
+              <a:spcAft>
+                <a:spcPts val="0"/>
+              </a:spcAft>
+              <a:buClrTx/>
+              <a:buSzTx/>
+              <a:buFontTx/>
+              <a:buNone/>
+              <a:tabLst/>
+              <a:defRPr/>
+            </a:pPr>
+            <a:r>
+              <a:rPr kumimoji="0" lang="en-US" sz="1400" b="0" i="0" u="none" strike="noStrike" kern="1200" cap="none" spc="0" normalizeH="0" baseline="0" noProof="0" dirty="0">
+                <a:ln>
+                  <a:noFill/>
+                </a:ln>
+                <a:solidFill>
+                  <a:srgbClr val="414444"/>
+                </a:solidFill>
+                <a:effectLst/>
+                <a:uLnTx/>
+                <a:uFillTx/>
+                <a:latin typeface="Courier New" panose="02070309020205020404" pitchFamily="49" charset="0"/>
+                <a:ea typeface="+mn-ea"/>
+                <a:cs typeface="Courier New" panose="02070309020205020404" pitchFamily="49" charset="0"/>
+              </a:rPr>
+              <a:t>system_&lt;</a:t>
+            </a:r>
+            <a:r>
+              <a:rPr kumimoji="0" lang="en-US" sz="1400" b="0" i="1" u="none" strike="noStrike" kern="1200" cap="none" spc="0" normalizeH="0" baseline="0" noProof="0" dirty="0">
+                <a:ln>
+                  <a:noFill/>
+                </a:ln>
+                <a:solidFill>
+                  <a:srgbClr val="414444"/>
+                </a:solidFill>
+                <a:effectLst/>
+                <a:uLnTx/>
+                <a:uFillTx/>
+                <a:latin typeface="Courier New" panose="02070309020205020404" pitchFamily="49" charset="0"/>
+                <a:ea typeface="+mn-ea"/>
+                <a:cs typeface="Courier New" panose="02070309020205020404" pitchFamily="49" charset="0"/>
+              </a:rPr>
+              <a:t>device </a:t>
+            </a:r>
+            <a:r>
+              <a:rPr kumimoji="0" lang="en-US" sz="1400" b="0" i="0" u="none" strike="noStrike" kern="1200" cap="none" spc="0" normalizeH="0" baseline="0" noProof="0" dirty="0">
+                <a:ln>
+                  <a:noFill/>
+                </a:ln>
+                <a:solidFill>
+                  <a:srgbClr val="414444"/>
+                </a:solidFill>
+                <a:effectLst/>
+                <a:uLnTx/>
+                <a:uFillTx/>
+                <a:latin typeface="Courier New" panose="02070309020205020404" pitchFamily="49" charset="0"/>
+                <a:ea typeface="+mn-ea"/>
+                <a:cs typeface="Courier New" panose="02070309020205020404" pitchFamily="49" charset="0"/>
+              </a:rPr>
+              <a:t>&gt;.c</a:t>
+            </a:r>
+            <a:br>
+              <a:rPr kumimoji="0" lang="en-US" sz="1600" b="0" i="0" u="none" strike="noStrike" kern="1200" cap="none" spc="0" normalizeH="0" baseline="0" noProof="0" dirty="0">
+                <a:ln>
+                  <a:noFill/>
+                </a:ln>
+                <a:solidFill>
+                  <a:srgbClr val="414444"/>
+                </a:solidFill>
+                <a:effectLst/>
+                <a:uLnTx/>
+                <a:uFillTx/>
+                <a:latin typeface="Gill Sans MT"/>
+                <a:ea typeface="+mn-ea"/>
+                <a:cs typeface="+mn-cs"/>
+              </a:rPr>
+            </a:br>
+            <a:r>
+              <a:rPr lang="en-US" sz="1600" dirty="0">
+                <a:solidFill>
+                  <a:srgbClr val="414444"/>
+                </a:solidFill>
+                <a:latin typeface="Calibri" panose="020F0502020204030204" pitchFamily="34" charset="0"/>
+                <a:cs typeface="Calibri" panose="020F0502020204030204" pitchFamily="34" charset="0"/>
+              </a:rPr>
+              <a:t>CMSIS system and</a:t>
+            </a:r>
+            <a:br>
+              <a:rPr lang="en-US" sz="1600" dirty="0">
+                <a:solidFill>
+                  <a:srgbClr val="414444"/>
+                </a:solidFill>
+                <a:latin typeface="Calibri" panose="020F0502020204030204" pitchFamily="34" charset="0"/>
+                <a:cs typeface="Calibri" panose="020F0502020204030204" pitchFamily="34" charset="0"/>
+              </a:rPr>
+            </a:br>
+            <a:r>
+              <a:rPr lang="en-US" sz="1600" dirty="0">
+                <a:solidFill>
+                  <a:srgbClr val="414444"/>
+                </a:solidFill>
+                <a:latin typeface="Calibri" panose="020F0502020204030204" pitchFamily="34" charset="0"/>
+                <a:cs typeface="Calibri" panose="020F0502020204030204" pitchFamily="34" charset="0"/>
+              </a:rPr>
+              <a:t>clock configuration</a:t>
+            </a:r>
+          </a:p>
+        </p:txBody>
+      </p:sp>
+      <p:sp>
+        <p:nvSpPr>
+          <p:cNvPr id="10" name="Snip Single Corner Rectangle 9"/>
+          <p:cNvSpPr/>
+          <p:nvPr/>
+        </p:nvSpPr>
+        <p:spPr bwMode="auto">
+          <a:xfrm>
+            <a:off x="822975" y="3912907"/>
+            <a:ext cx="2412000" cy="936000"/>
+          </a:xfrm>
+          <a:prstGeom prst="snip1Rect">
+            <a:avLst/>
+          </a:prstGeom>
+          <a:solidFill>
+            <a:srgbClr val="D5D6D6">
+              <a:alpha val="50000"/>
+            </a:srgbClr>
+          </a:solidFill>
+          <a:ln w="9525" cap="flat" cmpd="sng" algn="ctr">
+            <a:solidFill>
+              <a:schemeClr val="tx1"/>
+            </a:solidFill>
+            <a:prstDash val="solid"/>
+            <a:round/>
+            <a:headEnd type="none" w="med" len="med"/>
+            <a:tailEnd type="triangle" w="lg" len="med"/>
+          </a:ln>
+          <a:effectLst/>
+        </p:spPr>
+        <p:txBody>
+          <a:bodyPr wrap="none" anchor="t" anchorCtr="1"/>
+          <a:lstStyle/>
+          <a:p>
+            <a:pPr marL="0" marR="0" lvl="0" indent="0" algn="ctr" defTabSz="457181" rtl="0" eaLnBrk="1" fontAlgn="auto" latinLnBrk="0" hangingPunct="1">
+              <a:lnSpc>
+                <a:spcPct val="100000"/>
+              </a:lnSpc>
+              <a:spcBef>
+                <a:spcPts val="0"/>
+              </a:spcBef>
+              <a:spcAft>
+                <a:spcPts val="0"/>
+              </a:spcAft>
+              <a:buClrTx/>
+              <a:buSzTx/>
+              <a:buFontTx/>
+              <a:buNone/>
+              <a:tabLst/>
+              <a:defRPr/>
+            </a:pPr>
+            <a:r>
+              <a:rPr kumimoji="0" lang="en-US" sz="1400" b="0" i="0" u="none" strike="noStrike" kern="1200" cap="none" spc="0" normalizeH="0" baseline="0" noProof="0" dirty="0">
+                <a:ln>
+                  <a:noFill/>
+                </a:ln>
+                <a:solidFill>
+                  <a:srgbClr val="414444"/>
+                </a:solidFill>
+                <a:effectLst/>
+                <a:uLnTx/>
+                <a:uFillTx/>
+                <a:latin typeface="Courier New" panose="02070309020205020404" pitchFamily="49" charset="0"/>
+                <a:ea typeface="+mn-ea"/>
+                <a:cs typeface="Courier New" panose="02070309020205020404" pitchFamily="49" charset="0"/>
+              </a:rPr>
+              <a:t>&lt;</a:t>
+            </a:r>
+            <a:r>
+              <a:rPr kumimoji="0" lang="en-US" sz="1400" b="0" i="1" u="none" strike="noStrike" kern="1200" cap="none" spc="0" normalizeH="0" baseline="0" noProof="0" dirty="0">
+                <a:ln>
+                  <a:noFill/>
+                </a:ln>
+                <a:solidFill>
+                  <a:srgbClr val="414444"/>
+                </a:solidFill>
+                <a:effectLst/>
+                <a:uLnTx/>
+                <a:uFillTx/>
+                <a:latin typeface="Courier New" panose="02070309020205020404" pitchFamily="49" charset="0"/>
+                <a:ea typeface="+mn-ea"/>
+                <a:cs typeface="Courier New" panose="02070309020205020404" pitchFamily="49" charset="0"/>
+              </a:rPr>
+              <a:t>user </a:t>
+            </a:r>
+            <a:r>
+              <a:rPr kumimoji="0" lang="en-US" sz="1400" b="0" i="0" u="none" strike="noStrike" kern="1200" cap="none" spc="0" normalizeH="0" baseline="0" noProof="0" dirty="0">
+                <a:ln>
+                  <a:noFill/>
+                </a:ln>
+                <a:solidFill>
+                  <a:srgbClr val="414444"/>
+                </a:solidFill>
+                <a:effectLst/>
+                <a:uLnTx/>
+                <a:uFillTx/>
+                <a:latin typeface="Courier New" panose="02070309020205020404" pitchFamily="49" charset="0"/>
+                <a:ea typeface="+mn-ea"/>
+                <a:cs typeface="Courier New" panose="02070309020205020404" pitchFamily="49" charset="0"/>
+              </a:rPr>
+              <a:t>&gt;.c/</a:t>
+            </a:r>
+            <a:r>
+              <a:rPr kumimoji="0" lang="en-US" sz="1400" b="0" i="0" u="none" strike="noStrike" kern="1200" cap="none" spc="0" normalizeH="0" baseline="0" noProof="0" dirty="0" err="1">
+                <a:ln>
+                  <a:noFill/>
+                </a:ln>
+                <a:solidFill>
+                  <a:srgbClr val="414444"/>
+                </a:solidFill>
+                <a:effectLst/>
+                <a:uLnTx/>
+                <a:uFillTx/>
+                <a:latin typeface="Courier New" panose="02070309020205020404" pitchFamily="49" charset="0"/>
+                <a:ea typeface="+mn-ea"/>
+                <a:cs typeface="Courier New" panose="02070309020205020404" pitchFamily="49" charset="0"/>
+              </a:rPr>
+              <a:t>c++</a:t>
+            </a:r>
+            <a:br>
+              <a:rPr kumimoji="0" lang="en-US" sz="1400" b="0" i="0" u="none" strike="noStrike" kern="1200" cap="none" spc="0" normalizeH="0" baseline="0" noProof="0" dirty="0">
+                <a:ln>
+                  <a:noFill/>
+                </a:ln>
+                <a:solidFill>
+                  <a:srgbClr val="414444"/>
+                </a:solidFill>
+                <a:effectLst/>
+                <a:uLnTx/>
+                <a:uFillTx/>
+                <a:latin typeface="Courier New" panose="02070309020205020404" pitchFamily="49" charset="0"/>
+                <a:ea typeface="+mn-ea"/>
+                <a:cs typeface="Courier New" panose="02070309020205020404" pitchFamily="49" charset="0"/>
+              </a:rPr>
+            </a:br>
+            <a:r>
+              <a:rPr lang="en-US" sz="1600" dirty="0">
+                <a:solidFill>
+                  <a:srgbClr val="414444"/>
+                </a:solidFill>
+                <a:latin typeface="Calibri" panose="020F0502020204030204" pitchFamily="34" charset="0"/>
+                <a:cs typeface="Calibri" panose="020F0502020204030204" pitchFamily="34" charset="0"/>
+              </a:rPr>
+              <a:t>User application</a:t>
+            </a:r>
+            <a:br>
+              <a:rPr kumimoji="0" lang="en-US" sz="1600" b="0" i="0" u="none" strike="noStrike" kern="1200" cap="none" spc="0" normalizeH="0" baseline="0" noProof="0" dirty="0">
+                <a:ln>
+                  <a:noFill/>
+                </a:ln>
+                <a:solidFill>
+                  <a:srgbClr val="414444"/>
+                </a:solidFill>
+                <a:effectLst/>
+                <a:uLnTx/>
+                <a:uFillTx/>
+                <a:latin typeface="Gill Sans MT"/>
+                <a:ea typeface="+mn-ea"/>
+                <a:cs typeface="+mn-cs"/>
+              </a:rPr>
+            </a:br>
+            <a:r>
+              <a:rPr kumimoji="0" lang="en-US" sz="1600" b="0" i="0" u="none" strike="noStrike" kern="1200" cap="none" spc="0" normalizeH="0" baseline="0" noProof="0" dirty="0">
+                <a:ln>
+                  <a:noFill/>
+                </a:ln>
+                <a:solidFill>
+                  <a:srgbClr val="414444"/>
+                </a:solidFill>
+                <a:effectLst/>
+                <a:uLnTx/>
+                <a:uFillTx/>
+                <a:latin typeface="Courier New" pitchFamily="49" charset="0"/>
+                <a:ea typeface="+mn-ea"/>
+                <a:cs typeface="Courier New" pitchFamily="49" charset="0"/>
+              </a:rPr>
+              <a:t>main() { ... }</a:t>
+            </a:r>
+          </a:p>
+        </p:txBody>
+      </p:sp>
+      <p:sp>
+        <p:nvSpPr>
+          <p:cNvPr id="11" name="Snip Single Corner Rectangle 10"/>
+          <p:cNvSpPr/>
+          <p:nvPr/>
+        </p:nvSpPr>
+        <p:spPr bwMode="auto">
+          <a:xfrm>
+            <a:off x="3922030" y="3914211"/>
+            <a:ext cx="2412000" cy="936000"/>
+          </a:xfrm>
+          <a:prstGeom prst="snip1Rect">
+            <a:avLst/>
+          </a:prstGeom>
+          <a:solidFill>
+            <a:schemeClr val="accent2">
+              <a:lumMod val="20000"/>
+              <a:lumOff val="80000"/>
+            </a:schemeClr>
+          </a:solidFill>
+          <a:ln w="9525" cap="flat" cmpd="sng" algn="ctr">
+            <a:solidFill>
+              <a:schemeClr val="tx1"/>
+            </a:solidFill>
+            <a:prstDash val="solid"/>
+            <a:round/>
+            <a:headEnd type="none" w="med" len="med"/>
+            <a:tailEnd type="triangle" w="med" len="med"/>
+          </a:ln>
+          <a:effectLst/>
+        </p:spPr>
+        <p:txBody>
+          <a:bodyPr wrap="none" anchor="t" anchorCtr="1"/>
+          <a:lstStyle/>
+          <a:p>
+            <a:pPr marL="0" marR="0" lvl="0" indent="0" algn="ctr" defTabSz="457181" rtl="0" eaLnBrk="1" fontAlgn="auto" latinLnBrk="0" hangingPunct="1">
+              <a:lnSpc>
+                <a:spcPct val="100000"/>
+              </a:lnSpc>
+              <a:spcBef>
+                <a:spcPts val="0"/>
+              </a:spcBef>
+              <a:spcAft>
+                <a:spcPts val="0"/>
+              </a:spcAft>
+              <a:buClrTx/>
+              <a:buSzTx/>
+              <a:buFontTx/>
+              <a:buNone/>
+              <a:tabLst/>
+              <a:defRPr/>
+            </a:pPr>
+            <a:r>
+              <a:rPr kumimoji="0" lang="en-US" sz="1400" b="0" i="0" u="none" strike="noStrike" kern="1200" cap="none" spc="0" normalizeH="0" baseline="0" noProof="0" dirty="0">
+                <a:ln>
+                  <a:noFill/>
+                </a:ln>
+                <a:solidFill>
+                  <a:srgbClr val="414444"/>
+                </a:solidFill>
+                <a:effectLst/>
+                <a:uLnTx/>
+                <a:uFillTx/>
+                <a:latin typeface="Courier New" panose="02070309020205020404" pitchFamily="49" charset="0"/>
+                <a:ea typeface="+mn-ea"/>
+                <a:cs typeface="Courier New" panose="02070309020205020404" pitchFamily="49" charset="0"/>
+              </a:rPr>
+              <a:t>&lt;</a:t>
+            </a:r>
+            <a:r>
+              <a:rPr kumimoji="0" lang="en-US" sz="1400" b="0" i="1" u="none" strike="noStrike" kern="1200" cap="none" spc="0" normalizeH="0" baseline="0" noProof="0" dirty="0">
+                <a:ln>
+                  <a:noFill/>
+                </a:ln>
+                <a:solidFill>
+                  <a:srgbClr val="414444"/>
+                </a:solidFill>
+                <a:effectLst/>
+                <a:uLnTx/>
+                <a:uFillTx/>
+                <a:latin typeface="Courier New" panose="02070309020205020404" pitchFamily="49" charset="0"/>
+                <a:ea typeface="+mn-ea"/>
+                <a:cs typeface="Courier New" panose="02070309020205020404" pitchFamily="49" charset="0"/>
+              </a:rPr>
+              <a:t>device </a:t>
+            </a:r>
+            <a:r>
+              <a:rPr kumimoji="0" lang="en-US" sz="1400" b="0" i="0" u="none" strike="noStrike" kern="1200" cap="none" spc="0" normalizeH="0" baseline="0" noProof="0" dirty="0">
+                <a:ln>
+                  <a:noFill/>
+                </a:ln>
+                <a:solidFill>
+                  <a:srgbClr val="414444"/>
+                </a:solidFill>
+                <a:effectLst/>
+                <a:uLnTx/>
+                <a:uFillTx/>
+                <a:latin typeface="Courier New" panose="02070309020205020404" pitchFamily="49" charset="0"/>
+                <a:ea typeface="+mn-ea"/>
+                <a:cs typeface="Courier New" panose="02070309020205020404" pitchFamily="49" charset="0"/>
+              </a:rPr>
+              <a:t>&gt;.h</a:t>
+            </a:r>
+            <a:br>
+              <a:rPr kumimoji="0" lang="en-US" sz="1400" b="0" i="0" u="none" strike="noStrike" kern="1200" cap="none" spc="0" normalizeH="0" baseline="0" noProof="0" dirty="0">
+                <a:ln>
+                  <a:noFill/>
+                </a:ln>
+                <a:solidFill>
+                  <a:srgbClr val="414444"/>
+                </a:solidFill>
+                <a:effectLst/>
+                <a:uLnTx/>
+                <a:uFillTx/>
+                <a:latin typeface="Courier New" panose="02070309020205020404" pitchFamily="49" charset="0"/>
+                <a:ea typeface="+mn-ea"/>
+                <a:cs typeface="Courier New" panose="02070309020205020404" pitchFamily="49" charset="0"/>
+              </a:rPr>
+            </a:br>
+            <a:r>
+              <a:rPr lang="en-US" sz="1600" dirty="0">
+                <a:solidFill>
+                  <a:srgbClr val="414444"/>
+                </a:solidFill>
+                <a:latin typeface="Calibri" panose="020F0502020204030204" pitchFamily="34" charset="0"/>
+                <a:cs typeface="Calibri" panose="020F0502020204030204" pitchFamily="34" charset="0"/>
+              </a:rPr>
+              <a:t>CMSIS</a:t>
+            </a:r>
+            <a:br>
+              <a:rPr lang="en-US" sz="1600" dirty="0">
+                <a:solidFill>
+                  <a:srgbClr val="414444"/>
+                </a:solidFill>
+                <a:latin typeface="Calibri" panose="020F0502020204030204" pitchFamily="34" charset="0"/>
+                <a:cs typeface="Calibri" panose="020F0502020204030204" pitchFamily="34" charset="0"/>
+              </a:rPr>
+            </a:br>
+            <a:r>
+              <a:rPr lang="en-US" sz="1600" dirty="0">
+                <a:solidFill>
+                  <a:srgbClr val="414444"/>
+                </a:solidFill>
+                <a:latin typeface="Calibri" panose="020F0502020204030204" pitchFamily="34" charset="0"/>
+                <a:cs typeface="Calibri" panose="020F0502020204030204" pitchFamily="34" charset="0"/>
+              </a:rPr>
+              <a:t>device peripheral access</a:t>
+            </a:r>
+          </a:p>
+        </p:txBody>
+      </p:sp>
+      <p:cxnSp>
+        <p:nvCxnSpPr>
+          <p:cNvPr id="12" name="Straight Arrow Connector 26"/>
+          <p:cNvCxnSpPr>
+            <a:cxnSpLocks noChangeShapeType="1"/>
+            <a:stCxn id="11" idx="2"/>
+            <a:endCxn id="10" idx="0"/>
+          </p:cNvCxnSpPr>
+          <p:nvPr/>
+        </p:nvCxnSpPr>
+        <p:spPr bwMode="auto">
+          <a:xfrm flipH="1" flipV="1">
+            <a:off x="3234975" y="4380907"/>
+            <a:ext cx="687055" cy="1304"/>
+          </a:xfrm>
+          <a:prstGeom prst="straightConnector1">
+            <a:avLst/>
+          </a:prstGeom>
+          <a:noFill/>
+          <a:ln w="9525" algn="ctr">
+            <a:solidFill>
+              <a:schemeClr val="tx1"/>
+            </a:solidFill>
+            <a:round/>
+            <a:headEnd/>
+            <a:tailEnd type="triangle" w="med" len="med"/>
+          </a:ln>
+          <a:extLst>
+            <a:ext uri="{909E8E84-426E-40DD-AFC4-6F175D3DCCD1}">
+              <a14:hiddenFill xmlns:a14="http://schemas.microsoft.com/office/drawing/2010/main">
+                <a:noFill/>
+              </a14:hiddenFill>
+            </a:ext>
+          </a:extLst>
+        </p:spPr>
+      </p:cxnSp>
+      <p:sp>
+        <p:nvSpPr>
+          <p:cNvPr id="24" name="Snip Single Corner Rectangle 23"/>
+          <p:cNvSpPr/>
+          <p:nvPr/>
+        </p:nvSpPr>
+        <p:spPr bwMode="auto">
+          <a:xfrm>
+            <a:off x="3922030" y="2796907"/>
+            <a:ext cx="2412000" cy="936000"/>
+          </a:xfrm>
+          <a:prstGeom prst="snip1Rect">
+            <a:avLst/>
+          </a:prstGeom>
+          <a:solidFill>
+            <a:schemeClr val="accent2">
+              <a:lumMod val="20000"/>
+              <a:lumOff val="80000"/>
+            </a:schemeClr>
+          </a:solidFill>
+          <a:ln w="9525" cap="flat" cmpd="sng" algn="ctr">
+            <a:solidFill>
+              <a:schemeClr val="tx1"/>
+            </a:solidFill>
+            <a:prstDash val="solid"/>
+            <a:round/>
+            <a:headEnd type="none" w="med" len="med"/>
+            <a:tailEnd type="triangle" w="med" len="med"/>
+          </a:ln>
+          <a:effectLst/>
+        </p:spPr>
+        <p:txBody>
+          <a:bodyPr wrap="none" anchor="t" anchorCtr="1"/>
+          <a:lstStyle/>
+          <a:p>
+            <a:pPr marL="0" marR="0" lvl="0" indent="0" algn="ctr" defTabSz="457181" rtl="0" eaLnBrk="1" fontAlgn="auto" latinLnBrk="0" hangingPunct="1">
+              <a:lnSpc>
+                <a:spcPct val="100000"/>
+              </a:lnSpc>
+              <a:spcBef>
+                <a:spcPts val="0"/>
+              </a:spcBef>
+              <a:spcAft>
+                <a:spcPts val="0"/>
+              </a:spcAft>
+              <a:buClrTx/>
+              <a:buSzTx/>
+              <a:buFontTx/>
+              <a:buNone/>
+              <a:tabLst/>
+              <a:defRPr/>
+            </a:pPr>
+            <a:r>
+              <a:rPr kumimoji="0" lang="en-US" sz="1400" b="0" i="0" u="none" strike="noStrike" kern="1200" cap="none" spc="0" normalizeH="0" baseline="0" noProof="0" dirty="0">
+                <a:ln>
+                  <a:noFill/>
+                </a:ln>
+                <a:solidFill>
+                  <a:srgbClr val="414444"/>
+                </a:solidFill>
+                <a:effectLst/>
+                <a:uLnTx/>
+                <a:uFillTx/>
+                <a:latin typeface="Courier New" panose="02070309020205020404" pitchFamily="49" charset="0"/>
+                <a:ea typeface="+mn-ea"/>
+                <a:cs typeface="Courier New" panose="02070309020205020404" pitchFamily="49" charset="0"/>
+              </a:rPr>
+              <a:t>partitions_</a:t>
+            </a:r>
+            <a:r>
+              <a:rPr kumimoji="0" lang="en-US" sz="1400" b="0" i="1" u="none" strike="noStrike" kern="1200" cap="none" spc="0" normalizeH="0" baseline="0" noProof="0" dirty="0">
+                <a:ln>
+                  <a:noFill/>
+                </a:ln>
+                <a:solidFill>
+                  <a:srgbClr val="414444"/>
+                </a:solidFill>
+                <a:effectLst/>
+                <a:uLnTx/>
+                <a:uFillTx/>
+                <a:latin typeface="Courier New" panose="02070309020205020404" pitchFamily="49" charset="0"/>
+                <a:ea typeface="+mn-ea"/>
+                <a:cs typeface="Courier New" panose="02070309020205020404" pitchFamily="49" charset="0"/>
+              </a:rPr>
+              <a:t>&lt;device&gt;</a:t>
+            </a:r>
+            <a:r>
+              <a:rPr kumimoji="0" lang="en-US" sz="1400" b="0" i="0" u="none" strike="noStrike" kern="1200" cap="none" spc="0" normalizeH="0" baseline="0" noProof="0" dirty="0">
+                <a:ln>
+                  <a:noFill/>
+                </a:ln>
+                <a:solidFill>
+                  <a:srgbClr val="414444"/>
+                </a:solidFill>
+                <a:effectLst/>
+                <a:uLnTx/>
+                <a:uFillTx/>
+                <a:latin typeface="Courier New" panose="02070309020205020404" pitchFamily="49" charset="0"/>
+                <a:ea typeface="+mn-ea"/>
+                <a:cs typeface="Courier New" panose="02070309020205020404" pitchFamily="49" charset="0"/>
+              </a:rPr>
+              <a:t>.h</a:t>
+            </a:r>
+            <a:br>
+              <a:rPr kumimoji="0" lang="en-US" sz="1600" b="0" i="0" u="none" strike="noStrike" kern="1200" cap="none" spc="0" normalizeH="0" baseline="0" noProof="0" dirty="0">
+                <a:ln>
+                  <a:noFill/>
+                </a:ln>
+                <a:solidFill>
+                  <a:srgbClr val="414444"/>
+                </a:solidFill>
+                <a:effectLst/>
+                <a:uLnTx/>
+                <a:uFillTx/>
+                <a:latin typeface="Gill Sans MT"/>
+                <a:ea typeface="+mn-ea"/>
+                <a:cs typeface="+mn-cs"/>
+              </a:rPr>
+            </a:br>
+            <a:r>
+              <a:rPr kumimoji="0" lang="en-US" sz="1600" b="0" i="0" u="none" strike="noStrike" kern="1200" cap="none" spc="0" normalizeH="0" baseline="0" noProof="0" dirty="0">
+                <a:ln>
+                  <a:noFill/>
+                </a:ln>
+                <a:solidFill>
+                  <a:srgbClr val="414444"/>
+                </a:solidFill>
+                <a:effectLst/>
+                <a:uLnTx/>
+                <a:uFillTx/>
+                <a:latin typeface="Gill Sans MT"/>
+                <a:ea typeface="+mn-ea"/>
+                <a:cs typeface="+mn-cs"/>
+              </a:rPr>
+              <a:t>  </a:t>
+            </a:r>
+            <a:r>
+              <a:rPr lang="en-US" sz="1600" dirty="0">
+                <a:solidFill>
+                  <a:srgbClr val="414444"/>
+                </a:solidFill>
+                <a:latin typeface="Calibri" panose="020F0502020204030204" pitchFamily="34" charset="0"/>
+                <a:cs typeface="Calibri" panose="020F0502020204030204" pitchFamily="34" charset="0"/>
+              </a:rPr>
+              <a:t>Secure attributes and</a:t>
+            </a:r>
+            <a:br>
+              <a:rPr lang="en-US" sz="1600" dirty="0">
+                <a:solidFill>
+                  <a:srgbClr val="414444"/>
+                </a:solidFill>
+                <a:latin typeface="Calibri" panose="020F0502020204030204" pitchFamily="34" charset="0"/>
+                <a:cs typeface="Calibri" panose="020F0502020204030204" pitchFamily="34" charset="0"/>
+              </a:rPr>
+            </a:br>
+            <a:r>
+              <a:rPr lang="en-US" sz="1600" dirty="0">
+                <a:solidFill>
+                  <a:srgbClr val="414444"/>
+                </a:solidFill>
+                <a:latin typeface="Calibri" panose="020F0502020204030204" pitchFamily="34" charset="0"/>
+                <a:cs typeface="Calibri" panose="020F0502020204030204" pitchFamily="34" charset="0"/>
+              </a:rPr>
+              <a:t>interrupt assignment</a:t>
+            </a:r>
+          </a:p>
+        </p:txBody>
+      </p:sp>
+      <p:cxnSp>
+        <p:nvCxnSpPr>
+          <p:cNvPr id="25" name="Straight Arrow Connector 26"/>
+          <p:cNvCxnSpPr>
+            <a:cxnSpLocks noChangeShapeType="1"/>
+            <a:stCxn id="24" idx="2"/>
+            <a:endCxn id="9" idx="0"/>
+          </p:cNvCxnSpPr>
+          <p:nvPr/>
+        </p:nvCxnSpPr>
+        <p:spPr bwMode="auto">
+          <a:xfrm flipH="1">
+            <a:off x="3233483" y="3264907"/>
+            <a:ext cx="688547" cy="0"/>
+          </a:xfrm>
+          <a:prstGeom prst="straightConnector1">
+            <a:avLst/>
+          </a:prstGeom>
+          <a:noFill/>
+          <a:ln w="9525" algn="ctr">
+            <a:solidFill>
+              <a:schemeClr val="tx1"/>
+            </a:solidFill>
+            <a:round/>
+            <a:headEnd/>
+            <a:tailEnd type="triangle" w="med" len="med"/>
+          </a:ln>
+          <a:extLst>
+            <a:ext uri="{909E8E84-426E-40DD-AFC4-6F175D3DCCD1}">
+              <a14:hiddenFill xmlns:a14="http://schemas.microsoft.com/office/drawing/2010/main">
+                <a:noFill/>
+              </a14:hiddenFill>
+            </a:ext>
+          </a:extLst>
+        </p:spPr>
+      </p:cxnSp>
+      <p:sp>
+        <p:nvSpPr>
+          <p:cNvPr id="28" name="Snip Single Corner Rectangle 27"/>
+          <p:cNvSpPr/>
+          <p:nvPr/>
+        </p:nvSpPr>
+        <p:spPr bwMode="auto">
+          <a:xfrm>
+            <a:off x="820738" y="5029697"/>
+            <a:ext cx="552307" cy="330201"/>
+          </a:xfrm>
+          <a:prstGeom prst="snip1Rect">
+            <a:avLst/>
+          </a:prstGeom>
+          <a:solidFill>
+            <a:schemeClr val="accent3">
+              <a:lumMod val="40000"/>
+              <a:lumOff val="60000"/>
+            </a:schemeClr>
+          </a:solidFill>
+          <a:ln w="9525" cap="flat" cmpd="sng" algn="ctr">
+            <a:solidFill>
+              <a:schemeClr val="tx1"/>
+            </a:solidFill>
+            <a:prstDash val="solid"/>
+            <a:round/>
+            <a:headEnd type="none" w="med" len="med"/>
+            <a:tailEnd type="triangle" w="lg" len="med"/>
+          </a:ln>
+          <a:effectLst/>
+        </p:spPr>
+        <p:txBody>
+          <a:bodyPr wrap="none" lIns="121899" tIns="60949" rIns="121899" bIns="60949" anchor="b" anchorCtr="1"/>
+          <a:lstStyle/>
+          <a:p>
+            <a:pPr marL="0" marR="0" lvl="0" indent="0" algn="ctr" defTabSz="457181" rtl="0" eaLnBrk="1" fontAlgn="auto" latinLnBrk="0" hangingPunct="1">
+              <a:lnSpc>
+                <a:spcPct val="100000"/>
+              </a:lnSpc>
+              <a:spcBef>
+                <a:spcPts val="0"/>
+              </a:spcBef>
+              <a:spcAft>
+                <a:spcPts val="0"/>
+              </a:spcAft>
+              <a:buClrTx/>
+              <a:buSzTx/>
+              <a:buFontTx/>
+              <a:buNone/>
+              <a:tabLst/>
+              <a:defRPr/>
+            </a:pPr>
+            <a:endParaRPr kumimoji="0" lang="en-US" sz="1600" b="0" i="0" u="none" strike="noStrike" kern="1200" cap="none" spc="0" normalizeH="0" baseline="0" noProof="0" dirty="0">
+              <a:ln>
+                <a:noFill/>
+              </a:ln>
+              <a:solidFill>
+                <a:srgbClr val="414444"/>
+              </a:solidFill>
+              <a:effectLst/>
+              <a:uLnTx/>
+              <a:uFillTx/>
+              <a:latin typeface="Gill Sans MT"/>
+              <a:ea typeface="+mn-ea"/>
+              <a:cs typeface="Courier New" pitchFamily="49" charset="0"/>
+            </a:endParaRPr>
+          </a:p>
+        </p:txBody>
+      </p:sp>
+      <p:sp>
+        <p:nvSpPr>
+          <p:cNvPr id="29" name="Rectangle 12"/>
+          <p:cNvSpPr>
+            <a:spLocks noChangeArrowheads="1"/>
+          </p:cNvSpPr>
+          <p:nvPr/>
+        </p:nvSpPr>
+        <p:spPr bwMode="auto">
+          <a:xfrm>
+            <a:off x="1328377" y="5010142"/>
+            <a:ext cx="2356437" cy="369310"/>
+          </a:xfrm>
+          <a:prstGeom prst="rect">
+            <a:avLst/>
+          </a:prstGeom>
+          <a:noFill/>
+          <a:ln>
+            <a:noFill/>
+          </a:ln>
+          <a:extLst>
+            <a:ext uri="{909E8E84-426E-40DD-AFC4-6F175D3DCCD1}">
+              <a14:hiddenFill xmlns:a14="http://schemas.microsoft.com/office/drawing/2010/main">
+                <a:solidFill>
+                  <a:srgbClr val="FFFFFF"/>
+                </a:solidFill>
+              </a14:hiddenFill>
+            </a:ext>
+            <a:ext uri="{91240B29-F687-4F45-9708-019B960494DF}">
+              <a14:hiddenLine xmlns:a14="http://schemas.microsoft.com/office/drawing/2010/main" w="9525">
+                <a:solidFill>
+                  <a:srgbClr val="000000"/>
+                </a:solidFill>
+                <a:miter lim="800000"/>
+                <a:headEnd/>
+                <a:tailEnd/>
+              </a14:hiddenLine>
+            </a:ext>
+          </a:extLst>
+        </p:spPr>
+        <p:txBody>
+          <a:bodyPr wrap="square" lIns="121899" tIns="60949" rIns="121899" bIns="60949">
+            <a:spAutoFit/>
+          </a:bodyPr>
+          <a:lstStyle>
+            <a:lvl1pPr eaLnBrk="0" hangingPunct="0">
+              <a:defRPr sz="1400" b="1">
+                <a:solidFill>
+                  <a:srgbClr val="000000"/>
+                </a:solidFill>
+                <a:latin typeface="Arial" pitchFamily="34" charset="0"/>
+                <a:ea typeface="MS PGothic" pitchFamily="34" charset="-128"/>
+              </a:defRPr>
+            </a:lvl1pPr>
+            <a:lvl2pPr marL="742950" indent="-285750" eaLnBrk="0" hangingPunct="0">
+              <a:defRPr sz="1400" b="1">
+                <a:solidFill>
+                  <a:srgbClr val="000000"/>
+                </a:solidFill>
+                <a:latin typeface="Arial" pitchFamily="34" charset="0"/>
+                <a:ea typeface="MS PGothic" pitchFamily="34" charset="-128"/>
+              </a:defRPr>
+            </a:lvl2pPr>
+            <a:lvl3pPr marL="1143000" indent="-228600" eaLnBrk="0" hangingPunct="0">
+              <a:defRPr sz="1400" b="1">
+                <a:solidFill>
+                  <a:srgbClr val="000000"/>
+                </a:solidFill>
+                <a:latin typeface="Arial" pitchFamily="34" charset="0"/>
+                <a:ea typeface="MS PGothic" pitchFamily="34" charset="-128"/>
+              </a:defRPr>
+            </a:lvl3pPr>
+            <a:lvl4pPr marL="1600200" indent="-228600" eaLnBrk="0" hangingPunct="0">
+              <a:defRPr sz="1400" b="1">
+                <a:solidFill>
+                  <a:srgbClr val="000000"/>
+                </a:solidFill>
+                <a:latin typeface="Arial" pitchFamily="34" charset="0"/>
+                <a:ea typeface="MS PGothic" pitchFamily="34" charset="-128"/>
+              </a:defRPr>
+            </a:lvl4pPr>
+            <a:lvl5pPr marL="2057400" indent="-228600" eaLnBrk="0" hangingPunct="0">
+              <a:defRPr sz="1400" b="1">
+                <a:solidFill>
+                  <a:srgbClr val="000000"/>
+                </a:solidFill>
+                <a:latin typeface="Arial" pitchFamily="34" charset="0"/>
+                <a:ea typeface="MS PGothic" pitchFamily="34" charset="-128"/>
+              </a:defRPr>
+            </a:lvl5pPr>
+            <a:lvl6pPr marL="2514600" indent="-228600" eaLnBrk="0" fontAlgn="base" hangingPunct="0">
+              <a:spcBef>
+                <a:spcPct val="0"/>
+              </a:spcBef>
+              <a:spcAft>
+                <a:spcPct val="0"/>
+              </a:spcAft>
+              <a:defRPr sz="1400" b="1">
+                <a:solidFill>
+                  <a:srgbClr val="000000"/>
+                </a:solidFill>
+                <a:latin typeface="Arial" pitchFamily="34" charset="0"/>
+                <a:ea typeface="MS PGothic" pitchFamily="34" charset="-128"/>
+              </a:defRPr>
+            </a:lvl6pPr>
+            <a:lvl7pPr marL="2971800" indent="-228600" eaLnBrk="0" fontAlgn="base" hangingPunct="0">
+              <a:spcBef>
+                <a:spcPct val="0"/>
+              </a:spcBef>
+              <a:spcAft>
+                <a:spcPct val="0"/>
+              </a:spcAft>
+              <a:defRPr sz="1400" b="1">
+                <a:solidFill>
+                  <a:srgbClr val="000000"/>
+                </a:solidFill>
+                <a:latin typeface="Arial" pitchFamily="34" charset="0"/>
+                <a:ea typeface="MS PGothic" pitchFamily="34" charset="-128"/>
+              </a:defRPr>
+            </a:lvl7pPr>
+            <a:lvl8pPr marL="3429000" indent="-228600" eaLnBrk="0" fontAlgn="base" hangingPunct="0">
+              <a:spcBef>
+                <a:spcPct val="0"/>
+              </a:spcBef>
+              <a:spcAft>
+                <a:spcPct val="0"/>
+              </a:spcAft>
+              <a:defRPr sz="1400" b="1">
+                <a:solidFill>
+                  <a:srgbClr val="000000"/>
+                </a:solidFill>
+                <a:latin typeface="Arial" pitchFamily="34" charset="0"/>
+                <a:ea typeface="MS PGothic" pitchFamily="34" charset="-128"/>
+              </a:defRPr>
+            </a:lvl8pPr>
+            <a:lvl9pPr marL="3886200" indent="-228600" eaLnBrk="0" fontAlgn="base" hangingPunct="0">
+              <a:spcBef>
+                <a:spcPct val="0"/>
+              </a:spcBef>
+              <a:spcAft>
+                <a:spcPct val="0"/>
+              </a:spcAft>
+              <a:defRPr sz="1400" b="1">
+                <a:solidFill>
+                  <a:srgbClr val="000000"/>
+                </a:solidFill>
+                <a:latin typeface="Arial" pitchFamily="34" charset="0"/>
+                <a:ea typeface="MS PGothic" pitchFamily="34" charset="-128"/>
+              </a:defRPr>
+            </a:lvl9pPr>
+          </a:lstStyle>
+          <a:p>
+            <a:pPr marL="0" marR="0" lvl="0" indent="0" algn="l" defTabSz="457181" rtl="0" eaLnBrk="1" fontAlgn="auto" latinLnBrk="0" hangingPunct="1">
+              <a:lnSpc>
+                <a:spcPct val="100000"/>
+              </a:lnSpc>
+              <a:spcBef>
+                <a:spcPts val="0"/>
+              </a:spcBef>
+              <a:spcAft>
+                <a:spcPts val="0"/>
+              </a:spcAft>
+              <a:buClrTx/>
+              <a:buSzTx/>
+              <a:buFontTx/>
+              <a:buNone/>
+              <a:tabLst/>
+              <a:defRPr/>
+            </a:pPr>
+            <a:r>
+              <a:rPr kumimoji="0" lang="en-US" altLang="en-US" sz="1600" b="0" i="0" u="none" strike="noStrike" kern="1200" cap="none" spc="0" normalizeH="0" baseline="0" noProof="0" dirty="0">
+                <a:ln>
+                  <a:noFill/>
+                </a:ln>
+                <a:solidFill>
+                  <a:srgbClr val="414444"/>
+                </a:solidFill>
+                <a:effectLst/>
+                <a:uLnTx/>
+                <a:uFillTx/>
+                <a:latin typeface="Gill Sans MT"/>
+                <a:ea typeface="MS PGothic" pitchFamily="34" charset="-128"/>
+                <a:cs typeface="+mn-cs"/>
+              </a:rPr>
+              <a:t>CMSIS-CORE device files</a:t>
+            </a:r>
+            <a:endParaRPr kumimoji="0" lang="en-US" altLang="en-US" sz="1600" b="1" i="0" u="none" strike="noStrike" kern="1200" cap="none" spc="0" normalizeH="0" baseline="0" noProof="0" dirty="0">
+              <a:ln>
+                <a:noFill/>
+              </a:ln>
+              <a:solidFill>
+                <a:srgbClr val="414444"/>
+              </a:solidFill>
+              <a:effectLst/>
+              <a:uLnTx/>
+              <a:uFillTx/>
+              <a:latin typeface="Gill Sans MT"/>
+              <a:ea typeface="MS PGothic" pitchFamily="34" charset="-128"/>
+              <a:cs typeface="+mn-cs"/>
+            </a:endParaRPr>
+          </a:p>
+        </p:txBody>
+      </p:sp>
+      <p:sp>
+        <p:nvSpPr>
+          <p:cNvPr id="30" name="Rectangle 14"/>
+          <p:cNvSpPr>
+            <a:spLocks noChangeArrowheads="1"/>
+          </p:cNvSpPr>
+          <p:nvPr/>
+        </p:nvSpPr>
+        <p:spPr bwMode="auto">
+          <a:xfrm>
+            <a:off x="4474338" y="4948576"/>
+            <a:ext cx="2078862" cy="861752"/>
+          </a:xfrm>
+          <a:prstGeom prst="rect">
+            <a:avLst/>
+          </a:prstGeom>
+          <a:noFill/>
+          <a:ln>
+            <a:noFill/>
+          </a:ln>
+          <a:extLst>
+            <a:ext uri="{909E8E84-426E-40DD-AFC4-6F175D3DCCD1}">
+              <a14:hiddenFill xmlns:a14="http://schemas.microsoft.com/office/drawing/2010/main">
+                <a:solidFill>
+                  <a:srgbClr val="FFFFFF"/>
+                </a:solidFill>
+              </a14:hiddenFill>
+            </a:ext>
+            <a:ext uri="{91240B29-F687-4F45-9708-019B960494DF}">
+              <a14:hiddenLine xmlns:a14="http://schemas.microsoft.com/office/drawing/2010/main" w="9525">
+                <a:solidFill>
+                  <a:srgbClr val="000000"/>
+                </a:solidFill>
+                <a:miter lim="800000"/>
+                <a:headEnd/>
+                <a:tailEnd/>
+              </a14:hiddenLine>
+            </a:ext>
+          </a:extLst>
+        </p:spPr>
+        <p:txBody>
+          <a:bodyPr wrap="square" lIns="121899" tIns="60949" rIns="121899" bIns="60949">
+            <a:spAutoFit/>
+          </a:bodyPr>
+          <a:lstStyle>
+            <a:lvl1pPr eaLnBrk="0" hangingPunct="0">
+              <a:defRPr sz="1400" b="1">
+                <a:solidFill>
+                  <a:srgbClr val="000000"/>
+                </a:solidFill>
+                <a:latin typeface="Arial" pitchFamily="34" charset="0"/>
+                <a:ea typeface="MS PGothic" pitchFamily="34" charset="-128"/>
+              </a:defRPr>
+            </a:lvl1pPr>
+            <a:lvl2pPr marL="742950" indent="-285750" eaLnBrk="0" hangingPunct="0">
+              <a:defRPr sz="1400" b="1">
+                <a:solidFill>
+                  <a:srgbClr val="000000"/>
+                </a:solidFill>
+                <a:latin typeface="Arial" pitchFamily="34" charset="0"/>
+                <a:ea typeface="MS PGothic" pitchFamily="34" charset="-128"/>
+              </a:defRPr>
+            </a:lvl2pPr>
+            <a:lvl3pPr marL="1143000" indent="-228600" eaLnBrk="0" hangingPunct="0">
+              <a:defRPr sz="1400" b="1">
+                <a:solidFill>
+                  <a:srgbClr val="000000"/>
+                </a:solidFill>
+                <a:latin typeface="Arial" pitchFamily="34" charset="0"/>
+                <a:ea typeface="MS PGothic" pitchFamily="34" charset="-128"/>
+              </a:defRPr>
+            </a:lvl3pPr>
+            <a:lvl4pPr marL="1600200" indent="-228600" eaLnBrk="0" hangingPunct="0">
+              <a:defRPr sz="1400" b="1">
+                <a:solidFill>
+                  <a:srgbClr val="000000"/>
+                </a:solidFill>
+                <a:latin typeface="Arial" pitchFamily="34" charset="0"/>
+                <a:ea typeface="MS PGothic" pitchFamily="34" charset="-128"/>
+              </a:defRPr>
+            </a:lvl4pPr>
+            <a:lvl5pPr marL="2057400" indent="-228600" eaLnBrk="0" hangingPunct="0">
+              <a:defRPr sz="1400" b="1">
+                <a:solidFill>
+                  <a:srgbClr val="000000"/>
+                </a:solidFill>
+                <a:latin typeface="Arial" pitchFamily="34" charset="0"/>
+                <a:ea typeface="MS PGothic" pitchFamily="34" charset="-128"/>
+              </a:defRPr>
+            </a:lvl5pPr>
+            <a:lvl6pPr marL="2514600" indent="-228600" eaLnBrk="0" fontAlgn="base" hangingPunct="0">
+              <a:spcBef>
+                <a:spcPct val="0"/>
+              </a:spcBef>
+              <a:spcAft>
+                <a:spcPct val="0"/>
+              </a:spcAft>
+              <a:defRPr sz="1400" b="1">
+                <a:solidFill>
+                  <a:srgbClr val="000000"/>
+                </a:solidFill>
+                <a:latin typeface="Arial" pitchFamily="34" charset="0"/>
+                <a:ea typeface="MS PGothic" pitchFamily="34" charset="-128"/>
+              </a:defRPr>
+            </a:lvl6pPr>
+            <a:lvl7pPr marL="2971800" indent="-228600" eaLnBrk="0" fontAlgn="base" hangingPunct="0">
+              <a:spcBef>
+                <a:spcPct val="0"/>
+              </a:spcBef>
+              <a:spcAft>
+                <a:spcPct val="0"/>
+              </a:spcAft>
+              <a:defRPr sz="1400" b="1">
+                <a:solidFill>
+                  <a:srgbClr val="000000"/>
+                </a:solidFill>
+                <a:latin typeface="Arial" pitchFamily="34" charset="0"/>
+                <a:ea typeface="MS PGothic" pitchFamily="34" charset="-128"/>
+              </a:defRPr>
+            </a:lvl7pPr>
+            <a:lvl8pPr marL="3429000" indent="-228600" eaLnBrk="0" fontAlgn="base" hangingPunct="0">
+              <a:spcBef>
+                <a:spcPct val="0"/>
+              </a:spcBef>
+              <a:spcAft>
+                <a:spcPct val="0"/>
+              </a:spcAft>
+              <a:defRPr sz="1400" b="1">
+                <a:solidFill>
+                  <a:srgbClr val="000000"/>
+                </a:solidFill>
+                <a:latin typeface="Arial" pitchFamily="34" charset="0"/>
+                <a:ea typeface="MS PGothic" pitchFamily="34" charset="-128"/>
+              </a:defRPr>
+            </a:lvl8pPr>
+            <a:lvl9pPr marL="3886200" indent="-228600" eaLnBrk="0" fontAlgn="base" hangingPunct="0">
+              <a:spcBef>
+                <a:spcPct val="0"/>
+              </a:spcBef>
+              <a:spcAft>
+                <a:spcPct val="0"/>
+              </a:spcAft>
+              <a:defRPr sz="1400" b="1">
+                <a:solidFill>
+                  <a:srgbClr val="000000"/>
+                </a:solidFill>
+                <a:latin typeface="Arial" pitchFamily="34" charset="0"/>
+                <a:ea typeface="MS PGothic" pitchFamily="34" charset="-128"/>
+              </a:defRPr>
+            </a:lvl9pPr>
+          </a:lstStyle>
+          <a:p>
+            <a:pPr marL="0" marR="0" lvl="0" indent="0" algn="l" defTabSz="457181" rtl="0" eaLnBrk="1" fontAlgn="auto" latinLnBrk="0" hangingPunct="1">
+              <a:lnSpc>
+                <a:spcPct val="100000"/>
+              </a:lnSpc>
+              <a:spcBef>
+                <a:spcPts val="0"/>
+              </a:spcBef>
+              <a:spcAft>
+                <a:spcPts val="0"/>
+              </a:spcAft>
+              <a:buClrTx/>
+              <a:buSzTx/>
+              <a:buFontTx/>
+              <a:buNone/>
+              <a:tabLst/>
+              <a:defRPr/>
+            </a:pPr>
+            <a:r>
+              <a:rPr kumimoji="0" lang="en-US" altLang="en-US" sz="1600" b="0" i="0" u="none" strike="noStrike" kern="1200" cap="none" spc="0" normalizeH="0" baseline="0" noProof="0" dirty="0">
+                <a:ln>
+                  <a:noFill/>
+                </a:ln>
+                <a:solidFill>
+                  <a:srgbClr val="414444"/>
+                </a:solidFill>
+                <a:effectLst/>
+                <a:uLnTx/>
+                <a:uFillTx/>
+                <a:latin typeface="Gill Sans MT"/>
+                <a:ea typeface="MS PGothic" pitchFamily="34" charset="-128"/>
+                <a:cs typeface="+mn-cs"/>
+              </a:rPr>
+              <a:t>CMSIS-CORE header files generated from CMSIS-SVD</a:t>
+            </a:r>
+          </a:p>
+        </p:txBody>
+      </p:sp>
+      <p:sp>
+        <p:nvSpPr>
+          <p:cNvPr id="31" name="Snip Single Corner Rectangle 30"/>
+          <p:cNvSpPr/>
+          <p:nvPr/>
+        </p:nvSpPr>
+        <p:spPr bwMode="auto">
+          <a:xfrm>
+            <a:off x="820738" y="5540687"/>
+            <a:ext cx="552307" cy="332315"/>
+          </a:xfrm>
+          <a:prstGeom prst="snip1Rect">
+            <a:avLst/>
+          </a:prstGeom>
+          <a:solidFill>
+            <a:srgbClr val="D5D6D6">
+              <a:alpha val="50000"/>
+            </a:srgbClr>
+          </a:solidFill>
+          <a:ln w="9525" cap="flat" cmpd="sng" algn="ctr">
+            <a:solidFill>
+              <a:schemeClr val="tx1"/>
+            </a:solidFill>
+            <a:prstDash val="solid"/>
+            <a:round/>
+            <a:headEnd type="none" w="med" len="med"/>
+            <a:tailEnd type="triangle" w="lg" len="med"/>
+          </a:ln>
+          <a:effectLst/>
+        </p:spPr>
+        <p:txBody>
+          <a:bodyPr wrap="none" lIns="121899" tIns="60949" rIns="121899" bIns="60949" anchor="b" anchorCtr="1"/>
+          <a:lstStyle/>
+          <a:p>
+            <a:pPr marL="0" marR="0" lvl="0" indent="0" algn="ctr" defTabSz="457181" rtl="0" eaLnBrk="1" fontAlgn="auto" latinLnBrk="0" hangingPunct="1">
+              <a:lnSpc>
+                <a:spcPct val="100000"/>
+              </a:lnSpc>
+              <a:spcBef>
+                <a:spcPts val="0"/>
+              </a:spcBef>
+              <a:spcAft>
+                <a:spcPts val="0"/>
+              </a:spcAft>
+              <a:buClrTx/>
+              <a:buSzTx/>
+              <a:buFontTx/>
+              <a:buNone/>
+              <a:tabLst/>
+              <a:defRPr/>
+            </a:pPr>
+            <a:endParaRPr kumimoji="0" lang="en-US" sz="1600" b="0" i="0" u="none" strike="noStrike" kern="1200" cap="none" spc="0" normalizeH="0" baseline="0" noProof="0" dirty="0">
+              <a:ln>
+                <a:noFill/>
+              </a:ln>
+              <a:solidFill>
+                <a:srgbClr val="414444"/>
+              </a:solidFill>
+              <a:effectLst/>
+              <a:uLnTx/>
+              <a:uFillTx/>
+              <a:latin typeface="Courier New" pitchFamily="49" charset="0"/>
+              <a:ea typeface="+mn-ea"/>
+              <a:cs typeface="Courier New" pitchFamily="49" charset="0"/>
+            </a:endParaRPr>
+          </a:p>
+        </p:txBody>
+      </p:sp>
+      <p:sp>
+        <p:nvSpPr>
+          <p:cNvPr id="32" name="Rectangle 16"/>
+          <p:cNvSpPr>
+            <a:spLocks noChangeArrowheads="1"/>
+          </p:cNvSpPr>
+          <p:nvPr/>
+        </p:nvSpPr>
+        <p:spPr bwMode="auto">
+          <a:xfrm>
+            <a:off x="1373045" y="5523857"/>
+            <a:ext cx="1496465" cy="369310"/>
+          </a:xfrm>
+          <a:prstGeom prst="rect">
+            <a:avLst/>
+          </a:prstGeom>
+          <a:noFill/>
+          <a:ln>
+            <a:noFill/>
+          </a:ln>
+          <a:extLst>
+            <a:ext uri="{909E8E84-426E-40DD-AFC4-6F175D3DCCD1}">
+              <a14:hiddenFill xmlns:a14="http://schemas.microsoft.com/office/drawing/2010/main">
+                <a:solidFill>
+                  <a:srgbClr val="FFFFFF"/>
+                </a:solidFill>
+              </a14:hiddenFill>
+            </a:ext>
+            <a:ext uri="{91240B29-F687-4F45-9708-019B960494DF}">
+              <a14:hiddenLine xmlns:a14="http://schemas.microsoft.com/office/drawing/2010/main" w="9525">
+                <a:solidFill>
+                  <a:srgbClr val="000000"/>
+                </a:solidFill>
+                <a:miter lim="800000"/>
+                <a:headEnd/>
+                <a:tailEnd/>
+              </a14:hiddenLine>
+            </a:ext>
+          </a:extLst>
+        </p:spPr>
+        <p:txBody>
+          <a:bodyPr wrap="square" lIns="121899" tIns="60949" rIns="121899" bIns="60949">
+            <a:spAutoFit/>
+          </a:bodyPr>
+          <a:lstStyle>
+            <a:lvl1pPr eaLnBrk="0" hangingPunct="0">
+              <a:defRPr sz="1400" b="1">
+                <a:solidFill>
+                  <a:srgbClr val="000000"/>
+                </a:solidFill>
+                <a:latin typeface="Arial" pitchFamily="34" charset="0"/>
+                <a:ea typeface="MS PGothic" pitchFamily="34" charset="-128"/>
+              </a:defRPr>
+            </a:lvl1pPr>
+            <a:lvl2pPr marL="742950" indent="-285750" eaLnBrk="0" hangingPunct="0">
+              <a:defRPr sz="1400" b="1">
+                <a:solidFill>
+                  <a:srgbClr val="000000"/>
+                </a:solidFill>
+                <a:latin typeface="Arial" pitchFamily="34" charset="0"/>
+                <a:ea typeface="MS PGothic" pitchFamily="34" charset="-128"/>
+              </a:defRPr>
+            </a:lvl2pPr>
+            <a:lvl3pPr marL="1143000" indent="-228600" eaLnBrk="0" hangingPunct="0">
+              <a:defRPr sz="1400" b="1">
+                <a:solidFill>
+                  <a:srgbClr val="000000"/>
+                </a:solidFill>
+                <a:latin typeface="Arial" pitchFamily="34" charset="0"/>
+                <a:ea typeface="MS PGothic" pitchFamily="34" charset="-128"/>
+              </a:defRPr>
+            </a:lvl3pPr>
+            <a:lvl4pPr marL="1600200" indent="-228600" eaLnBrk="0" hangingPunct="0">
+              <a:defRPr sz="1400" b="1">
+                <a:solidFill>
+                  <a:srgbClr val="000000"/>
+                </a:solidFill>
+                <a:latin typeface="Arial" pitchFamily="34" charset="0"/>
+                <a:ea typeface="MS PGothic" pitchFamily="34" charset="-128"/>
+              </a:defRPr>
+            </a:lvl4pPr>
+            <a:lvl5pPr marL="2057400" indent="-228600" eaLnBrk="0" hangingPunct="0">
+              <a:defRPr sz="1400" b="1">
+                <a:solidFill>
+                  <a:srgbClr val="000000"/>
+                </a:solidFill>
+                <a:latin typeface="Arial" pitchFamily="34" charset="0"/>
+                <a:ea typeface="MS PGothic" pitchFamily="34" charset="-128"/>
+              </a:defRPr>
+            </a:lvl5pPr>
+            <a:lvl6pPr marL="2514600" indent="-228600" eaLnBrk="0" fontAlgn="base" hangingPunct="0">
+              <a:spcBef>
+                <a:spcPct val="0"/>
+              </a:spcBef>
+              <a:spcAft>
+                <a:spcPct val="0"/>
+              </a:spcAft>
+              <a:defRPr sz="1400" b="1">
+                <a:solidFill>
+                  <a:srgbClr val="000000"/>
+                </a:solidFill>
+                <a:latin typeface="Arial" pitchFamily="34" charset="0"/>
+                <a:ea typeface="MS PGothic" pitchFamily="34" charset="-128"/>
+              </a:defRPr>
+            </a:lvl6pPr>
+            <a:lvl7pPr marL="2971800" indent="-228600" eaLnBrk="0" fontAlgn="base" hangingPunct="0">
+              <a:spcBef>
+                <a:spcPct val="0"/>
+              </a:spcBef>
+              <a:spcAft>
+                <a:spcPct val="0"/>
+              </a:spcAft>
+              <a:defRPr sz="1400" b="1">
+                <a:solidFill>
+                  <a:srgbClr val="000000"/>
+                </a:solidFill>
+                <a:latin typeface="Arial" pitchFamily="34" charset="0"/>
+                <a:ea typeface="MS PGothic" pitchFamily="34" charset="-128"/>
+              </a:defRPr>
+            </a:lvl7pPr>
+            <a:lvl8pPr marL="3429000" indent="-228600" eaLnBrk="0" fontAlgn="base" hangingPunct="0">
+              <a:spcBef>
+                <a:spcPct val="0"/>
+              </a:spcBef>
+              <a:spcAft>
+                <a:spcPct val="0"/>
+              </a:spcAft>
+              <a:defRPr sz="1400" b="1">
+                <a:solidFill>
+                  <a:srgbClr val="000000"/>
+                </a:solidFill>
+                <a:latin typeface="Arial" pitchFamily="34" charset="0"/>
+                <a:ea typeface="MS PGothic" pitchFamily="34" charset="-128"/>
+              </a:defRPr>
+            </a:lvl8pPr>
+            <a:lvl9pPr marL="3886200" indent="-228600" eaLnBrk="0" fontAlgn="base" hangingPunct="0">
+              <a:spcBef>
+                <a:spcPct val="0"/>
+              </a:spcBef>
+              <a:spcAft>
+                <a:spcPct val="0"/>
+              </a:spcAft>
+              <a:defRPr sz="1400" b="1">
+                <a:solidFill>
+                  <a:srgbClr val="000000"/>
+                </a:solidFill>
+                <a:latin typeface="Arial" pitchFamily="34" charset="0"/>
+                <a:ea typeface="MS PGothic" pitchFamily="34" charset="-128"/>
+              </a:defRPr>
+            </a:lvl9pPr>
+          </a:lstStyle>
+          <a:p>
+            <a:pPr marL="0" marR="0" lvl="0" indent="0" algn="l" defTabSz="457181" rtl="0" eaLnBrk="1" fontAlgn="auto" latinLnBrk="0" hangingPunct="1">
+              <a:lnSpc>
+                <a:spcPct val="100000"/>
+              </a:lnSpc>
+              <a:spcBef>
+                <a:spcPts val="0"/>
+              </a:spcBef>
+              <a:spcAft>
+                <a:spcPts val="0"/>
+              </a:spcAft>
+              <a:buClrTx/>
+              <a:buSzTx/>
+              <a:buFontTx/>
+              <a:buNone/>
+              <a:tabLst/>
+              <a:defRPr/>
+            </a:pPr>
+            <a:r>
+              <a:rPr kumimoji="0" lang="en-US" altLang="en-US" sz="1600" b="0" i="0" u="none" strike="noStrike" kern="1200" cap="none" spc="0" normalizeH="0" baseline="0" noProof="0" dirty="0">
+                <a:ln>
+                  <a:noFill/>
+                </a:ln>
+                <a:solidFill>
+                  <a:srgbClr val="414444"/>
+                </a:solidFill>
+                <a:effectLst/>
+                <a:uLnTx/>
+                <a:uFillTx/>
+                <a:latin typeface="Gill Sans MT"/>
+                <a:ea typeface="MS PGothic" pitchFamily="34" charset="-128"/>
+                <a:cs typeface="+mn-cs"/>
+              </a:rPr>
+              <a:t>User program</a:t>
+            </a:r>
+            <a:endParaRPr kumimoji="0" lang="en-US" altLang="en-US" sz="1600" b="1" i="0" u="none" strike="noStrike" kern="1200" cap="none" spc="0" normalizeH="0" baseline="0" noProof="0" dirty="0">
+              <a:ln>
+                <a:noFill/>
+              </a:ln>
+              <a:solidFill>
+                <a:srgbClr val="414444"/>
+              </a:solidFill>
+              <a:effectLst/>
+              <a:uLnTx/>
+              <a:uFillTx/>
+              <a:latin typeface="Gill Sans MT"/>
+              <a:ea typeface="MS PGothic" pitchFamily="34" charset="-128"/>
+              <a:cs typeface="+mn-cs"/>
+            </a:endParaRPr>
+          </a:p>
+        </p:txBody>
+      </p:sp>
+      <p:sp>
+        <p:nvSpPr>
+          <p:cNvPr id="33" name="Snip Single Corner Rectangle 32"/>
+          <p:cNvSpPr/>
+          <p:nvPr/>
+        </p:nvSpPr>
+        <p:spPr bwMode="auto">
+          <a:xfrm>
+            <a:off x="3922030" y="5036969"/>
+            <a:ext cx="552307" cy="325967"/>
+          </a:xfrm>
+          <a:prstGeom prst="snip1Rect">
+            <a:avLst/>
+          </a:prstGeom>
+          <a:solidFill>
+            <a:schemeClr val="accent2">
+              <a:lumMod val="40000"/>
+              <a:lumOff val="60000"/>
+              <a:alpha val="85000"/>
+            </a:schemeClr>
+          </a:solidFill>
+          <a:ln w="9525" cap="flat" cmpd="sng" algn="ctr">
+            <a:solidFill>
+              <a:schemeClr val="tx1"/>
+            </a:solidFill>
+            <a:prstDash val="solid"/>
+            <a:round/>
+            <a:headEnd type="none" w="med" len="med"/>
+            <a:tailEnd type="triangle" w="lg" len="med"/>
+          </a:ln>
+          <a:effectLst/>
+        </p:spPr>
+        <p:txBody>
+          <a:bodyPr wrap="none" lIns="121899" tIns="60949" rIns="121899" bIns="60949" anchor="b" anchorCtr="1"/>
+          <a:lstStyle/>
+          <a:p>
+            <a:pPr marL="0" marR="0" lvl="0" indent="0" algn="ctr" defTabSz="457181" rtl="0" eaLnBrk="1" fontAlgn="auto" latinLnBrk="0" hangingPunct="1">
+              <a:lnSpc>
+                <a:spcPct val="100000"/>
+              </a:lnSpc>
+              <a:spcBef>
+                <a:spcPts val="0"/>
+              </a:spcBef>
+              <a:spcAft>
+                <a:spcPts val="0"/>
+              </a:spcAft>
+              <a:buClrTx/>
+              <a:buSzTx/>
+              <a:buFontTx/>
+              <a:buNone/>
+              <a:tabLst/>
+              <a:defRPr/>
+            </a:pPr>
+            <a:endParaRPr kumimoji="0" lang="en-US" sz="1600" b="0" i="0" u="none" strike="noStrike" kern="1200" cap="none" spc="0" normalizeH="0" baseline="0" noProof="0" dirty="0">
+              <a:ln>
+                <a:noFill/>
+              </a:ln>
+              <a:solidFill>
+                <a:srgbClr val="414444"/>
+              </a:solidFill>
+              <a:effectLst/>
+              <a:uLnTx/>
+              <a:uFillTx/>
+              <a:latin typeface="Gill Sans MT"/>
+              <a:ea typeface="+mn-ea"/>
+              <a:cs typeface="Courier New" pitchFamily="49" charset="0"/>
+            </a:endParaRPr>
+          </a:p>
+        </p:txBody>
+      </p:sp>
+      <p:sp>
+        <p:nvSpPr>
+          <p:cNvPr id="15" name="Snip Single Corner Rectangle 23">
+            <a:extLst>
+              <a:ext uri="{FF2B5EF4-FFF2-40B4-BE49-F238E27FC236}">
+                <a16:creationId xmlns:a16="http://schemas.microsoft.com/office/drawing/2014/main" id="{88719D49-E284-46F1-B1CB-E837705D3DCD}"/>
+              </a:ext>
+            </a:extLst>
+          </p:cNvPr>
+          <p:cNvSpPr/>
+          <p:nvPr/>
+        </p:nvSpPr>
+        <p:spPr bwMode="auto">
+          <a:xfrm>
+            <a:off x="7022577" y="2796907"/>
+            <a:ext cx="2412000" cy="936000"/>
+          </a:xfrm>
+          <a:prstGeom prst="snip1Rect">
+            <a:avLst/>
+          </a:prstGeom>
+          <a:solidFill>
+            <a:srgbClr val="FFFFCC"/>
+          </a:solidFill>
+          <a:ln w="9525" cap="flat" cmpd="sng" algn="ctr">
+            <a:solidFill>
+              <a:schemeClr val="tx1"/>
+            </a:solidFill>
+            <a:prstDash val="solid"/>
+            <a:round/>
+            <a:headEnd type="none" w="med" len="med"/>
+            <a:tailEnd type="triangle" w="med" len="med"/>
+          </a:ln>
+          <a:effectLst/>
+        </p:spPr>
+        <p:txBody>
+          <a:bodyPr wrap="none" anchor="t" anchorCtr="1"/>
+          <a:lstStyle/>
+          <a:p>
+            <a:pPr marL="0" marR="0" lvl="0" indent="0" algn="ctr" defTabSz="457181" rtl="0" eaLnBrk="1" fontAlgn="auto" latinLnBrk="0" hangingPunct="1">
+              <a:lnSpc>
+                <a:spcPct val="100000"/>
+              </a:lnSpc>
+              <a:spcBef>
+                <a:spcPts val="0"/>
+              </a:spcBef>
+              <a:spcAft>
+                <a:spcPts val="0"/>
+              </a:spcAft>
+              <a:buClrTx/>
+              <a:buSzTx/>
+              <a:buFontTx/>
+              <a:buNone/>
+              <a:tabLst/>
+              <a:defRPr/>
+            </a:pPr>
+            <a:r>
+              <a:rPr kumimoji="0" lang="en-US" sz="1400" b="0" i="0" u="none" strike="noStrike" kern="1200" cap="none" spc="0" normalizeH="0" baseline="0" noProof="0" dirty="0" err="1">
+                <a:ln>
+                  <a:noFill/>
+                </a:ln>
+                <a:solidFill>
+                  <a:srgbClr val="414444"/>
+                </a:solidFill>
+                <a:effectLst/>
+                <a:uLnTx/>
+                <a:uFillTx/>
+                <a:latin typeface="Courier New" panose="02070309020205020404" pitchFamily="49" charset="0"/>
+                <a:ea typeface="+mn-ea"/>
+                <a:cs typeface="Courier New" panose="02070309020205020404" pitchFamily="49" charset="0"/>
+              </a:rPr>
+              <a:t>partition_</a:t>
+            </a:r>
+            <a:r>
+              <a:rPr kumimoji="0" lang="en-US" sz="1400" b="0" u="none" strike="noStrike" kern="1200" cap="none" spc="0" normalizeH="0" baseline="0" noProof="0" dirty="0" err="1">
+                <a:ln>
+                  <a:noFill/>
+                </a:ln>
+                <a:solidFill>
+                  <a:srgbClr val="414444"/>
+                </a:solidFill>
+                <a:effectLst/>
+                <a:uLnTx/>
+                <a:uFillTx/>
+                <a:latin typeface="Courier New" panose="02070309020205020404" pitchFamily="49" charset="0"/>
+                <a:ea typeface="+mn-ea"/>
+                <a:cs typeface="Courier New" panose="02070309020205020404" pitchFamily="49" charset="0"/>
+              </a:rPr>
+              <a:t>gen</a:t>
+            </a:r>
+            <a:r>
+              <a:rPr kumimoji="0" lang="en-US" sz="1400" b="0" i="0" u="none" strike="noStrike" kern="1200" cap="none" spc="0" normalizeH="0" baseline="0" noProof="0" dirty="0" err="1">
+                <a:ln>
+                  <a:noFill/>
+                </a:ln>
+                <a:solidFill>
+                  <a:srgbClr val="414444"/>
+                </a:solidFill>
+                <a:effectLst/>
+                <a:uLnTx/>
+                <a:uFillTx/>
+                <a:latin typeface="Courier New" panose="02070309020205020404" pitchFamily="49" charset="0"/>
+                <a:ea typeface="+mn-ea"/>
+                <a:cs typeface="Courier New" panose="02070309020205020404" pitchFamily="49" charset="0"/>
+              </a:rPr>
+              <a:t>.h</a:t>
+            </a:r>
+            <a:br>
+              <a:rPr kumimoji="0" lang="en-US" sz="1600" b="0" i="0" u="none" strike="noStrike" kern="1200" cap="none" spc="0" normalizeH="0" baseline="0" noProof="0" dirty="0">
+                <a:ln>
+                  <a:noFill/>
+                </a:ln>
+                <a:solidFill>
+                  <a:srgbClr val="414444"/>
+                </a:solidFill>
+                <a:effectLst/>
+                <a:uLnTx/>
+                <a:uFillTx/>
+                <a:latin typeface="Gill Sans MT"/>
+                <a:ea typeface="+mn-ea"/>
+                <a:cs typeface="+mn-cs"/>
+              </a:rPr>
+            </a:br>
+            <a:r>
+              <a:rPr kumimoji="0" lang="en-US" sz="1600" b="0" i="0" u="none" strike="noStrike" kern="1200" cap="none" spc="0" normalizeH="0" baseline="0" noProof="0" dirty="0">
+                <a:ln>
+                  <a:noFill/>
+                </a:ln>
+                <a:solidFill>
+                  <a:srgbClr val="414444"/>
+                </a:solidFill>
+                <a:effectLst/>
+                <a:uLnTx/>
+                <a:uFillTx/>
+                <a:latin typeface="Gill Sans MT"/>
+                <a:ea typeface="+mn-ea"/>
+                <a:cs typeface="+mn-cs"/>
+              </a:rPr>
+              <a:t>  </a:t>
+            </a:r>
+            <a:r>
+              <a:rPr lang="en-US" sz="1600" dirty="0">
+                <a:solidFill>
+                  <a:srgbClr val="414444"/>
+                </a:solidFill>
+                <a:latin typeface="Calibri" panose="020F0502020204030204" pitchFamily="34" charset="0"/>
+                <a:cs typeface="Calibri" panose="020F0502020204030204" pitchFamily="34" charset="0"/>
+              </a:rPr>
+              <a:t>SAU regions and</a:t>
+            </a:r>
+          </a:p>
+          <a:p>
+            <a:pPr marL="0" marR="0" lvl="0" indent="0" algn="ctr" defTabSz="457181" rtl="0" eaLnBrk="1" fontAlgn="auto" latinLnBrk="0" hangingPunct="1">
+              <a:lnSpc>
+                <a:spcPct val="100000"/>
+              </a:lnSpc>
+              <a:spcBef>
+                <a:spcPts val="0"/>
+              </a:spcBef>
+              <a:spcAft>
+                <a:spcPts val="0"/>
+              </a:spcAft>
+              <a:buClrTx/>
+              <a:buSzTx/>
+              <a:buFontTx/>
+              <a:buNone/>
+              <a:tabLst/>
+              <a:defRPr/>
+            </a:pPr>
+            <a:r>
+              <a:rPr lang="en-US" sz="1600" dirty="0">
+                <a:solidFill>
+                  <a:srgbClr val="414444"/>
+                </a:solidFill>
+                <a:latin typeface="Calibri" panose="020F0502020204030204" pitchFamily="34" charset="0"/>
+                <a:cs typeface="Calibri" panose="020F0502020204030204" pitchFamily="34" charset="0"/>
+              </a:rPr>
+              <a:t>NVIC ISR assignment</a:t>
+            </a:r>
+          </a:p>
+        </p:txBody>
+      </p:sp>
+      <p:cxnSp>
+        <p:nvCxnSpPr>
+          <p:cNvPr id="16" name="Straight Arrow Connector 26">
+            <a:extLst>
+              <a:ext uri="{FF2B5EF4-FFF2-40B4-BE49-F238E27FC236}">
+                <a16:creationId xmlns:a16="http://schemas.microsoft.com/office/drawing/2014/main" id="{16C169E5-557C-42A2-8DCA-D9B4036FD3FC}"/>
+              </a:ext>
+            </a:extLst>
+          </p:cNvPr>
+          <p:cNvCxnSpPr>
+            <a:cxnSpLocks noChangeShapeType="1"/>
+            <a:stCxn id="15" idx="2"/>
+          </p:cNvCxnSpPr>
+          <p:nvPr/>
+        </p:nvCxnSpPr>
+        <p:spPr bwMode="auto">
+          <a:xfrm flipH="1">
+            <a:off x="6334030" y="3264907"/>
+            <a:ext cx="688547" cy="0"/>
+          </a:xfrm>
+          <a:prstGeom prst="straightConnector1">
+            <a:avLst/>
+          </a:prstGeom>
+          <a:noFill/>
+          <a:ln w="9525" algn="ctr">
+            <a:solidFill>
+              <a:schemeClr val="tx1"/>
+            </a:solidFill>
+            <a:round/>
+            <a:headEnd/>
+            <a:tailEnd type="triangle" w="med" len="med"/>
+          </a:ln>
+          <a:extLst>
+            <a:ext uri="{909E8E84-426E-40DD-AFC4-6F175D3DCCD1}">
+              <a14:hiddenFill xmlns:a14="http://schemas.microsoft.com/office/drawing/2010/main">
+                <a:noFill/>
+              </a14:hiddenFill>
+            </a:ext>
+          </a:extLst>
+        </p:spPr>
+      </p:cxnSp>
+      <p:sp>
+        <p:nvSpPr>
+          <p:cNvPr id="17" name="Snip Single Corner Rectangle 27">
+            <a:extLst>
+              <a:ext uri="{FF2B5EF4-FFF2-40B4-BE49-F238E27FC236}">
+                <a16:creationId xmlns:a16="http://schemas.microsoft.com/office/drawing/2014/main" id="{C6AD2BC6-7BF0-47B4-9211-48B46D79B2E9}"/>
+              </a:ext>
+            </a:extLst>
+          </p:cNvPr>
+          <p:cNvSpPr/>
+          <p:nvPr/>
+        </p:nvSpPr>
+        <p:spPr bwMode="auto">
+          <a:xfrm>
+            <a:off x="7022577" y="5036969"/>
+            <a:ext cx="552307" cy="330201"/>
+          </a:xfrm>
+          <a:prstGeom prst="snip1Rect">
+            <a:avLst/>
+          </a:prstGeom>
+          <a:solidFill>
+            <a:srgbClr val="FFFFCC"/>
+          </a:solidFill>
+          <a:ln w="9525" cap="flat" cmpd="sng" algn="ctr">
+            <a:solidFill>
+              <a:schemeClr val="tx1"/>
+            </a:solidFill>
+            <a:prstDash val="solid"/>
+            <a:round/>
+            <a:headEnd type="none" w="med" len="med"/>
+            <a:tailEnd type="triangle" w="lg" len="med"/>
+          </a:ln>
+          <a:effectLst/>
+        </p:spPr>
+        <p:txBody>
+          <a:bodyPr wrap="none" lIns="121899" tIns="60949" rIns="121899" bIns="60949" anchor="b" anchorCtr="1"/>
+          <a:lstStyle/>
+          <a:p>
+            <a:pPr marL="0" marR="0" lvl="0" indent="0" algn="ctr" defTabSz="457181" rtl="0" eaLnBrk="1" fontAlgn="auto" latinLnBrk="0" hangingPunct="1">
+              <a:lnSpc>
+                <a:spcPct val="100000"/>
+              </a:lnSpc>
+              <a:spcBef>
+                <a:spcPts val="0"/>
+              </a:spcBef>
+              <a:spcAft>
+                <a:spcPts val="0"/>
+              </a:spcAft>
+              <a:buClrTx/>
+              <a:buSzTx/>
+              <a:buFontTx/>
+              <a:buNone/>
+              <a:tabLst/>
+              <a:defRPr/>
+            </a:pPr>
+            <a:endParaRPr kumimoji="0" lang="en-US" sz="1600" b="0" i="0" u="none" strike="noStrike" kern="1200" cap="none" spc="0" normalizeH="0" baseline="0" noProof="0" dirty="0">
+              <a:ln>
+                <a:noFill/>
+              </a:ln>
+              <a:solidFill>
+                <a:srgbClr val="414444"/>
+              </a:solidFill>
+              <a:effectLst/>
+              <a:uLnTx/>
+              <a:uFillTx/>
+              <a:latin typeface="Gill Sans MT"/>
+              <a:ea typeface="+mn-ea"/>
+              <a:cs typeface="Courier New" pitchFamily="49" charset="0"/>
+            </a:endParaRPr>
+          </a:p>
+        </p:txBody>
+      </p:sp>
+      <p:sp>
+        <p:nvSpPr>
+          <p:cNvPr id="18" name="Rectangle 12">
+            <a:extLst>
+              <a:ext uri="{FF2B5EF4-FFF2-40B4-BE49-F238E27FC236}">
+                <a16:creationId xmlns:a16="http://schemas.microsoft.com/office/drawing/2014/main" id="{B6780F5D-C3DF-42C6-9644-FAAE8F805F0B}"/>
+              </a:ext>
+            </a:extLst>
+          </p:cNvPr>
+          <p:cNvSpPr>
+            <a:spLocks noChangeArrowheads="1"/>
+          </p:cNvSpPr>
+          <p:nvPr/>
+        </p:nvSpPr>
+        <p:spPr bwMode="auto">
+          <a:xfrm>
+            <a:off x="7574885" y="5017414"/>
+            <a:ext cx="2195922" cy="615531"/>
+          </a:xfrm>
+          <a:prstGeom prst="rect">
+            <a:avLst/>
+          </a:prstGeom>
+          <a:noFill/>
+          <a:ln>
+            <a:noFill/>
+          </a:ln>
+          <a:extLst>
+            <a:ext uri="{909E8E84-426E-40DD-AFC4-6F175D3DCCD1}">
+              <a14:hiddenFill xmlns:a14="http://schemas.microsoft.com/office/drawing/2010/main">
+                <a:solidFill>
+                  <a:srgbClr val="FFFFFF"/>
+                </a:solidFill>
+              </a14:hiddenFill>
+            </a:ext>
+            <a:ext uri="{91240B29-F687-4F45-9708-019B960494DF}">
+              <a14:hiddenLine xmlns:a14="http://schemas.microsoft.com/office/drawing/2010/main" w="9525">
+                <a:solidFill>
+                  <a:srgbClr val="000000"/>
+                </a:solidFill>
+                <a:miter lim="800000"/>
+                <a:headEnd/>
+                <a:tailEnd/>
+              </a14:hiddenLine>
+            </a:ext>
+          </a:extLst>
+        </p:spPr>
+        <p:txBody>
+          <a:bodyPr wrap="square" lIns="121899" tIns="60949" rIns="121899" bIns="60949">
+            <a:spAutoFit/>
+          </a:bodyPr>
+          <a:lstStyle>
+            <a:lvl1pPr eaLnBrk="0" hangingPunct="0">
+              <a:defRPr sz="1400" b="1">
+                <a:solidFill>
+                  <a:srgbClr val="000000"/>
+                </a:solidFill>
+                <a:latin typeface="Arial" pitchFamily="34" charset="0"/>
+                <a:ea typeface="MS PGothic" pitchFamily="34" charset="-128"/>
+              </a:defRPr>
+            </a:lvl1pPr>
+            <a:lvl2pPr marL="742950" indent="-285750" eaLnBrk="0" hangingPunct="0">
+              <a:defRPr sz="1400" b="1">
+                <a:solidFill>
+                  <a:srgbClr val="000000"/>
+                </a:solidFill>
+                <a:latin typeface="Arial" pitchFamily="34" charset="0"/>
+                <a:ea typeface="MS PGothic" pitchFamily="34" charset="-128"/>
+              </a:defRPr>
+            </a:lvl2pPr>
+            <a:lvl3pPr marL="1143000" indent="-228600" eaLnBrk="0" hangingPunct="0">
+              <a:defRPr sz="1400" b="1">
+                <a:solidFill>
+                  <a:srgbClr val="000000"/>
+                </a:solidFill>
+                <a:latin typeface="Arial" pitchFamily="34" charset="0"/>
+                <a:ea typeface="MS PGothic" pitchFamily="34" charset="-128"/>
+              </a:defRPr>
+            </a:lvl3pPr>
+            <a:lvl4pPr marL="1600200" indent="-228600" eaLnBrk="0" hangingPunct="0">
+              <a:defRPr sz="1400" b="1">
+                <a:solidFill>
+                  <a:srgbClr val="000000"/>
+                </a:solidFill>
+                <a:latin typeface="Arial" pitchFamily="34" charset="0"/>
+                <a:ea typeface="MS PGothic" pitchFamily="34" charset="-128"/>
+              </a:defRPr>
+            </a:lvl4pPr>
+            <a:lvl5pPr marL="2057400" indent="-228600" eaLnBrk="0" hangingPunct="0">
+              <a:defRPr sz="1400" b="1">
+                <a:solidFill>
+                  <a:srgbClr val="000000"/>
+                </a:solidFill>
+                <a:latin typeface="Arial" pitchFamily="34" charset="0"/>
+                <a:ea typeface="MS PGothic" pitchFamily="34" charset="-128"/>
+              </a:defRPr>
+            </a:lvl5pPr>
+            <a:lvl6pPr marL="2514600" indent="-228600" eaLnBrk="0" fontAlgn="base" hangingPunct="0">
+              <a:spcBef>
+                <a:spcPct val="0"/>
+              </a:spcBef>
+              <a:spcAft>
+                <a:spcPct val="0"/>
+              </a:spcAft>
+              <a:defRPr sz="1400" b="1">
+                <a:solidFill>
+                  <a:srgbClr val="000000"/>
+                </a:solidFill>
+                <a:latin typeface="Arial" pitchFamily="34" charset="0"/>
+                <a:ea typeface="MS PGothic" pitchFamily="34" charset="-128"/>
+              </a:defRPr>
+            </a:lvl6pPr>
+            <a:lvl7pPr marL="2971800" indent="-228600" eaLnBrk="0" fontAlgn="base" hangingPunct="0">
+              <a:spcBef>
+                <a:spcPct val="0"/>
+              </a:spcBef>
+              <a:spcAft>
+                <a:spcPct val="0"/>
+              </a:spcAft>
+              <a:defRPr sz="1400" b="1">
+                <a:solidFill>
+                  <a:srgbClr val="000000"/>
+                </a:solidFill>
+                <a:latin typeface="Arial" pitchFamily="34" charset="0"/>
+                <a:ea typeface="MS PGothic" pitchFamily="34" charset="-128"/>
+              </a:defRPr>
+            </a:lvl7pPr>
+            <a:lvl8pPr marL="3429000" indent="-228600" eaLnBrk="0" fontAlgn="base" hangingPunct="0">
+              <a:spcBef>
+                <a:spcPct val="0"/>
+              </a:spcBef>
+              <a:spcAft>
+                <a:spcPct val="0"/>
+              </a:spcAft>
+              <a:defRPr sz="1400" b="1">
+                <a:solidFill>
+                  <a:srgbClr val="000000"/>
+                </a:solidFill>
+                <a:latin typeface="Arial" pitchFamily="34" charset="0"/>
+                <a:ea typeface="MS PGothic" pitchFamily="34" charset="-128"/>
+              </a:defRPr>
+            </a:lvl8pPr>
+            <a:lvl9pPr marL="3886200" indent="-228600" eaLnBrk="0" fontAlgn="base" hangingPunct="0">
+              <a:spcBef>
+                <a:spcPct val="0"/>
+              </a:spcBef>
+              <a:spcAft>
+                <a:spcPct val="0"/>
+              </a:spcAft>
+              <a:defRPr sz="1400" b="1">
+                <a:solidFill>
+                  <a:srgbClr val="000000"/>
+                </a:solidFill>
+                <a:latin typeface="Arial" pitchFamily="34" charset="0"/>
+                <a:ea typeface="MS PGothic" pitchFamily="34" charset="-128"/>
+              </a:defRPr>
+            </a:lvl9pPr>
+          </a:lstStyle>
+          <a:p>
+            <a:pPr marL="0" marR="0" lvl="0" indent="0" algn="l" defTabSz="457181" rtl="0" eaLnBrk="1" fontAlgn="auto" latinLnBrk="0" hangingPunct="1">
+              <a:lnSpc>
+                <a:spcPct val="100000"/>
+              </a:lnSpc>
+              <a:spcBef>
+                <a:spcPts val="0"/>
+              </a:spcBef>
+              <a:spcAft>
+                <a:spcPts val="0"/>
+              </a:spcAft>
+              <a:buClrTx/>
+              <a:buSzTx/>
+              <a:buFontTx/>
+              <a:buNone/>
+              <a:tabLst/>
+              <a:defRPr/>
+            </a:pPr>
+            <a:r>
+              <a:rPr kumimoji="0" lang="en-US" altLang="en-US" sz="1600" b="0" i="0" u="none" strike="noStrike" kern="1200" cap="none" spc="0" normalizeH="0" baseline="0" noProof="0" dirty="0">
+                <a:ln>
+                  <a:noFill/>
+                </a:ln>
+                <a:solidFill>
+                  <a:srgbClr val="414444"/>
+                </a:solidFill>
+                <a:effectLst/>
+                <a:uLnTx/>
+                <a:uFillTx/>
+                <a:latin typeface="Gill Sans MT"/>
+                <a:ea typeface="MS PGothic" pitchFamily="34" charset="-128"/>
+                <a:cs typeface="+mn-cs"/>
+              </a:rPr>
+              <a:t>CMSIS-Zone generated header files</a:t>
+            </a:r>
+            <a:endParaRPr kumimoji="0" lang="en-US" altLang="en-US" sz="1600" b="1" i="0" u="none" strike="noStrike" kern="1200" cap="none" spc="0" normalizeH="0" baseline="0" noProof="0" dirty="0">
+              <a:ln>
+                <a:noFill/>
+              </a:ln>
+              <a:solidFill>
+                <a:srgbClr val="414444"/>
+              </a:solidFill>
+              <a:effectLst/>
+              <a:uLnTx/>
+              <a:uFillTx/>
+              <a:latin typeface="Gill Sans MT"/>
+              <a:ea typeface="MS PGothic" pitchFamily="34" charset="-128"/>
+              <a:cs typeface="+mn-cs"/>
+            </a:endParaRPr>
+          </a:p>
+        </p:txBody>
+      </p:sp>
+    </p:spTree>
+    <p:extLst>
+      <p:ext uri="{BB962C8B-B14F-4D97-AF65-F5344CB8AC3E}">
+        <p14:creationId xmlns:p14="http://schemas.microsoft.com/office/powerpoint/2010/main" val="258943389"/>
       </p:ext>
     </p:extLst>
   </p:cSld>
@@ -37417,18 +39611,18 @@
 </file>
 
 <file path=customXml/item2.xml><?xml version="1.0" encoding="utf-8"?>
-<p:properties xmlns:p="http://schemas.microsoft.com/office/2006/metadata/properties" xmlns:xsi="http://www.w3.org/2001/XMLSchema-instance">
-  <documentManagement/>
-</p:properties>
-</file>
-
-<file path=customXml/item3.xml><?xml version="1.0" encoding="utf-8"?>
 <?mso-contentType ?>
 <FormTemplates xmlns="http://schemas.microsoft.com/sharepoint/v3/contenttype/forms">
   <Display>DocumentLibraryForm</Display>
   <Edit>DocumentLibraryForm</Edit>
   <New>DocumentLibraryForm</New>
 </FormTemplates>
+</file>
+
+<file path=customXml/item3.xml><?xml version="1.0" encoding="utf-8"?>
+<p:properties xmlns:p="http://schemas.microsoft.com/office/2006/metadata/properties" xmlns:xsi="http://www.w3.org/2001/XMLSchema-instance">
+  <documentManagement/>
+</p:properties>
 </file>
 
 <file path=customXml/itemProps1.xml><?xml version="1.0" encoding="utf-8"?>
@@ -37448,6 +39642,14 @@
 </file>
 
 <file path=customXml/itemProps2.xml><?xml version="1.0" encoding="utf-8"?>
+<ds:datastoreItem xmlns:ds="http://schemas.openxmlformats.org/officeDocument/2006/customXml" ds:itemID="{9C777C69-0744-4BF3-8514-FB149EBD2248}">
+  <ds:schemaRefs>
+    <ds:schemaRef ds:uri="http://schemas.microsoft.com/sharepoint/v3/contenttype/forms"/>
+  </ds:schemaRefs>
+</ds:datastoreItem>
+</file>
+
+<file path=customXml/itemProps3.xml><?xml version="1.0" encoding="utf-8"?>
 <ds:datastoreItem xmlns:ds="http://schemas.openxmlformats.org/officeDocument/2006/customXml" ds:itemID="{AE6E82D6-7FB8-4D99-A7B6-3C5BB1D894B9}">
   <ds:schemaRefs>
     <ds:schemaRef ds:uri="http://purl.org/dc/terms/"/>
@@ -37460,12 +39662,4 @@
     <ds:schemaRef ds:uri="http://schemas.openxmlformats.org/package/2006/metadata/core-properties"/>
   </ds:schemaRefs>
 </ds:datastoreItem>
-</file>
-
-<file path=customXml/itemProps3.xml><?xml version="1.0" encoding="utf-8"?>
-<ds:datastoreItem xmlns:ds="http://schemas.openxmlformats.org/officeDocument/2006/customXml" ds:itemID="{9C777C69-0744-4BF3-8514-FB149EBD2248}">
-  <ds:schemaRefs>
-    <ds:schemaRef ds:uri="http://schemas.microsoft.com/sharepoint/v3/contenttype/forms"/>
-  </ds:schemaRefs>
-</ds:datastoreItem>
 </file>
</xml_diff>

<commit_message>
CMSIS Documentation: Updated CMSIS-Core(M) documentation and device template files.
</commit_message>
<xml_diff>
--- a/CMSIS/DoxyGen/Core/src/images/ARMv8-M_images.pptx
+++ b/CMSIS/DoxyGen/Core/src/images/ARMv8-M_images.pptx
@@ -248,7 +248,7 @@
             <a:fld id="{E72D30EF-8F20-0B47-8B5D-39A8BC29E860}" type="datetimeFigureOut">
               <a:rPr lang="en-US" smtClean="0"/>
               <a:pPr/>
-              <a:t>2/19/2020</a:t>
+              <a:t>2/5/2021</a:t>
             </a:fld>
             <a:endParaRPr lang="en-US"/>
           </a:p>
@@ -416,7 +416,7 @@
             <a:fld id="{77EDD36E-1E02-F241-9611-1F1D9EAAD326}" type="datetimeFigureOut">
               <a:rPr lang="en-US" smtClean="0"/>
               <a:pPr/>
-              <a:t>2/19/2020</a:t>
+              <a:t>2/5/2021</a:t>
             </a:fld>
             <a:endParaRPr lang="en-US"/>
           </a:p>
@@ -17948,10 +17948,7 @@
             <a:avLst/>
           </a:prstGeom>
           <a:solidFill>
-            <a:schemeClr val="accent3">
-              <a:lumMod val="20000"/>
-              <a:lumOff val="80000"/>
-            </a:schemeClr>
+            <a:srgbClr val="00B0F0"/>
           </a:solidFill>
           <a:ln w="9525" cap="flat" cmpd="sng" algn="ctr">
             <a:solidFill>
@@ -18034,7 +18031,7 @@
                 <a:ea typeface="+mn-ea"/>
                 <a:cs typeface="Courier New" panose="02070309020205020404" pitchFamily="49" charset="0"/>
               </a:rPr>
-              <a:t>&gt;.s</a:t>
+              <a:t>&gt;.c</a:t>
             </a:r>
             <a:br>
               <a:rPr kumimoji="0" lang="en-US" sz="1400" b="0" i="0" u="none" strike="noStrike" kern="1200" cap="none" spc="0" normalizeH="0" baseline="0" noProof="0" dirty="0">
@@ -18101,7 +18098,7 @@
             <a:avLst/>
           </a:prstGeom>
           <a:solidFill>
-            <a:srgbClr val="C5EDF8"/>
+            <a:srgbClr val="00B0F0"/>
           </a:solidFill>
           <a:ln w="9525" cap="flat" cmpd="sng" algn="ctr">
             <a:solidFill>
@@ -18284,7 +18281,7 @@
             <a:avLst/>
           </a:prstGeom>
           <a:solidFill>
-            <a:srgbClr val="D5D6D6">
+            <a:srgbClr val="B5CDD8">
               <a:alpha val="50000"/>
             </a:srgbClr>
           </a:solidFill>
@@ -18916,10 +18913,7 @@
             <a:avLst/>
           </a:prstGeom>
           <a:solidFill>
-            <a:schemeClr val="accent3">
-              <a:lumMod val="40000"/>
-              <a:lumOff val="60000"/>
-            </a:schemeClr>
+            <a:srgbClr val="00B0F0"/>
           </a:solidFill>
           <a:ln w="9525" cap="flat" cmpd="sng" algn="ctr">
             <a:solidFill>
@@ -19410,7 +19404,7 @@
             <a:avLst/>
           </a:prstGeom>
           <a:solidFill>
-            <a:srgbClr val="D5D6D6">
+            <a:srgbClr val="B5CDD8">
               <a:alpha val="50000"/>
             </a:srgbClr>
           </a:solidFill>
@@ -19781,10 +19775,7 @@
             <a:avLst/>
           </a:prstGeom>
           <a:solidFill>
-            <a:schemeClr val="accent3">
-              <a:lumMod val="20000"/>
-              <a:lumOff val="80000"/>
-            </a:schemeClr>
+            <a:srgbClr val="00B0F0"/>
           </a:solidFill>
           <a:ln w="9525" cap="flat" cmpd="sng" algn="ctr">
             <a:solidFill>
@@ -19867,7 +19858,7 @@
                 <a:ea typeface="+mn-ea"/>
                 <a:cs typeface="Courier New" panose="02070309020205020404" pitchFamily="49" charset="0"/>
               </a:rPr>
-              <a:t>&gt;.s</a:t>
+              <a:t>&gt;.c</a:t>
             </a:r>
             <a:br>
               <a:rPr kumimoji="0" lang="en-US" sz="1400" b="0" i="0" u="none" strike="noStrike" kern="1200" cap="none" spc="0" normalizeH="0" baseline="0" noProof="0" dirty="0">
@@ -19919,7 +19910,7 @@
             <a:avLst/>
           </a:prstGeom>
           <a:solidFill>
-            <a:srgbClr val="C5EDF8"/>
+            <a:srgbClr val="00B0F0"/>
           </a:solidFill>
           <a:ln w="9525" cap="flat" cmpd="sng" algn="ctr">
             <a:solidFill>
@@ -20067,7 +20058,7 @@
             <a:avLst/>
           </a:prstGeom>
           <a:solidFill>
-            <a:srgbClr val="D5D6D6">
+            <a:srgbClr val="B5CDD8">
               <a:alpha val="50000"/>
             </a:srgbClr>
           </a:solidFill>
@@ -20639,10 +20630,7 @@
             <a:avLst/>
           </a:prstGeom>
           <a:solidFill>
-            <a:schemeClr val="accent3">
-              <a:lumMod val="40000"/>
-              <a:lumOff val="60000"/>
-            </a:schemeClr>
+            <a:srgbClr val="00B0F0"/>
           </a:solidFill>
           <a:ln w="9525" cap="flat" cmpd="sng" algn="ctr">
             <a:solidFill>
@@ -21100,7 +21088,7 @@
             <a:avLst/>
           </a:prstGeom>
           <a:solidFill>
-            <a:srgbClr val="D5D6D6">
+            <a:srgbClr val="B5CDD8">
               <a:alpha val="50000"/>
             </a:srgbClr>
           </a:solidFill>
@@ -28858,10 +28846,7 @@
               <a:avLst/>
             </a:prstGeom>
             <a:solidFill>
-              <a:schemeClr val="accent3">
-                <a:lumMod val="20000"/>
-                <a:lumOff val="80000"/>
-              </a:schemeClr>
+              <a:srgbClr val="00B0F0"/>
             </a:solidFill>
             <a:ln w="9525" cap="flat" cmpd="sng" algn="ctr">
               <a:solidFill>
@@ -28927,7 +28912,7 @@
               <a:avLst/>
             </a:prstGeom>
             <a:solidFill>
-              <a:srgbClr val="C5EDF8"/>
+              <a:srgbClr val="00B0F0"/>
             </a:solidFill>
             <a:ln w="9525" cap="flat" cmpd="sng" algn="ctr">
               <a:solidFill>
@@ -29000,8 +28985,8 @@
               <a:avLst/>
             </a:prstGeom>
             <a:solidFill>
-              <a:srgbClr val="D5D6D6">
-                <a:alpha val="50000"/>
+              <a:srgbClr val="B5CDD8">
+                <a:alpha val="49804"/>
               </a:srgbClr>
             </a:solidFill>
             <a:ln w="9525" cap="flat" cmpd="sng" algn="ctr">
@@ -29291,10 +29276,7 @@
             <a:avLst/>
           </a:prstGeom>
           <a:solidFill>
-            <a:schemeClr val="accent3">
-              <a:lumMod val="40000"/>
-              <a:lumOff val="60000"/>
-            </a:schemeClr>
+            <a:srgbClr val="00B0F0"/>
           </a:solidFill>
           <a:ln w="9525" cap="flat" cmpd="sng" algn="ctr">
             <a:solidFill>
@@ -29685,7 +29667,7 @@
             <a:avLst/>
           </a:prstGeom>
           <a:solidFill>
-            <a:srgbClr val="D5D6D6">
+            <a:srgbClr val="B5CDD8">
               <a:alpha val="50000"/>
             </a:srgbClr>
           </a:solidFill>
@@ -39497,6 +39479,15 @@
 </file>
 
 <file path=customXml/item1.xml><?xml version="1.0" encoding="utf-8"?>
+<?mso-contentType ?>
+<FormTemplates xmlns="http://schemas.microsoft.com/sharepoint/v3/contenttype/forms">
+  <Display>DocumentLibraryForm</Display>
+  <Edit>DocumentLibraryForm</Edit>
+  <New>DocumentLibraryForm</New>
+</FormTemplates>
+</file>
+
+<file path=customXml/item2.xml><?xml version="1.0" encoding="utf-8"?>
 <ct:contentTypeSchema xmlns:ct="http://schemas.microsoft.com/office/2006/metadata/contentType" xmlns:ma="http://schemas.microsoft.com/office/2006/metadata/properties/metaAttributes" ct:_="" ma:_="" ma:contentTypeName="Document" ma:contentTypeID="0x010100CAE3FC6E4566A44694FF6BF40EC1C126" ma:contentTypeVersion="0" ma:contentTypeDescription="Create a new document." ma:contentTypeScope="" ma:versionID="0c5b8ba185a47c7168257d800a15637f">
   <xsd:schema xmlns:xsd="http://www.w3.org/2001/XMLSchema" xmlns:xs="http://www.w3.org/2001/XMLSchema" xmlns:p="http://schemas.microsoft.com/office/2006/metadata/properties" targetNamespace="http://schemas.microsoft.com/office/2006/metadata/properties" ma:root="true" ma:fieldsID="c64490b4aec6201516c3a874156f37b2">
     <xsd:element name="properties">
@@ -39610,15 +39601,6 @@
 </ct:contentTypeSchema>
 </file>
 
-<file path=customXml/item2.xml><?xml version="1.0" encoding="utf-8"?>
-<?mso-contentType ?>
-<FormTemplates xmlns="http://schemas.microsoft.com/sharepoint/v3/contenttype/forms">
-  <Display>DocumentLibraryForm</Display>
-  <Edit>DocumentLibraryForm</Edit>
-  <New>DocumentLibraryForm</New>
-</FormTemplates>
-</file>
-
 <file path=customXml/item3.xml><?xml version="1.0" encoding="utf-8"?>
 <p:properties xmlns:p="http://schemas.microsoft.com/office/2006/metadata/properties" xmlns:xsi="http://www.w3.org/2001/XMLSchema-instance">
   <documentManagement/>
@@ -39626,6 +39608,14 @@
 </file>
 
 <file path=customXml/itemProps1.xml><?xml version="1.0" encoding="utf-8"?>
+<ds:datastoreItem xmlns:ds="http://schemas.openxmlformats.org/officeDocument/2006/customXml" ds:itemID="{9C777C69-0744-4BF3-8514-FB149EBD2248}">
+  <ds:schemaRefs>
+    <ds:schemaRef ds:uri="http://schemas.microsoft.com/sharepoint/v3/contenttype/forms"/>
+  </ds:schemaRefs>
+</ds:datastoreItem>
+</file>
+
+<file path=customXml/itemProps2.xml><?xml version="1.0" encoding="utf-8"?>
 <ds:datastoreItem xmlns:ds="http://schemas.openxmlformats.org/officeDocument/2006/customXml" ds:itemID="{FD99A681-1CE7-4872-A113-126DF10B3AAF}">
   <ds:schemaRefs>
     <ds:schemaRef ds:uri="http://schemas.microsoft.com/office/2006/metadata/contentType"/>
@@ -39637,14 +39627,6 @@
     <ds:schemaRef ds:uri="http://purl.org/dc/terms/"/>
     <ds:schemaRef ds:uri="http://schemas.microsoft.com/internal/obd"/>
     <ds:schemaRef ds:uri="http://schemas.microsoft.com/office/infopath/2007/PartnerControls"/>
-  </ds:schemaRefs>
-</ds:datastoreItem>
-</file>
-
-<file path=customXml/itemProps2.xml><?xml version="1.0" encoding="utf-8"?>
-<ds:datastoreItem xmlns:ds="http://schemas.openxmlformats.org/officeDocument/2006/customXml" ds:itemID="{9C777C69-0744-4BF3-8514-FB149EBD2248}">
-  <ds:schemaRefs>
-    <ds:schemaRef ds:uri="http://schemas.microsoft.com/sharepoint/v3/contenttype/forms"/>
   </ds:schemaRefs>
 </ds:datastoreItem>
 </file>

</xml_diff>